<commit_message>
updated and added a slide to the presentation
</commit_message>
<xml_diff>
--- a/QA-Automation-Middle-Project.pptx
+++ b/QA-Automation-Middle-Project.pptx
@@ -5,7 +5,7 @@
     <p:sldMasterId id="2147483648" r:id="rId1"/>
   </p:sldMasterIdLst>
   <p:notesMasterIdLst>
-    <p:notesMasterId r:id="rId8"/>
+    <p:notesMasterId r:id="rId10"/>
   </p:notesMasterIdLst>
   <p:sldIdLst>
     <p:sldId id="256" r:id="rId2"/>
@@ -14,26 +14,28 @@
     <p:sldId id="259" r:id="rId5"/>
     <p:sldId id="260" r:id="rId6"/>
     <p:sldId id="261" r:id="rId7"/>
+    <p:sldId id="263" r:id="rId8"/>
+    <p:sldId id="262" r:id="rId9"/>
   </p:sldIdLst>
   <p:sldSz cx="14630400" cy="8229600"/>
   <p:notesSz cx="8229600" cy="14630400"/>
   <p:embeddedFontLst>
     <p:embeddedFont>
       <p:font typeface="Mongolian Baiti" panose="03000500000000000000" pitchFamily="66" charset="0"/>
-      <p:regular r:id="rId9"/>
+      <p:regular r:id="rId11"/>
     </p:embeddedFont>
     <p:embeddedFont>
       <p:font typeface="MuseoModerno Medium" panose="020B0604020202020204" charset="0"/>
-      <p:regular r:id="rId10"/>
+      <p:regular r:id="rId12"/>
     </p:embeddedFont>
     <p:embeddedFont>
       <p:font typeface="Source Sans Pro" panose="020B0503030403020204" pitchFamily="34" charset="0"/>
-      <p:regular r:id="rId11"/>
-      <p:bold r:id="rId12"/>
+      <p:regular r:id="rId13"/>
+      <p:bold r:id="rId14"/>
     </p:embeddedFont>
     <p:embeddedFont>
       <p:font typeface="Source Sans Pro Bold" panose="020B0703030403020204" charset="0"/>
-      <p:bold r:id="rId13"/>
+      <p:bold r:id="rId15"/>
     </p:embeddedFont>
   </p:embeddedFontLst>
   <p:defaultTextStyle>
@@ -768,6 +770,222 @@
 </p:notes>
 </file>
 
+<file path=ppt/notesSlides/notesSlide7.xml><?xml version="1.0" encoding="utf-8"?>
+<p:notes xmlns:a="http://schemas.openxmlformats.org/drawingml/2006/main" xmlns:r="http://schemas.openxmlformats.org/officeDocument/2006/relationships" xmlns:p="http://schemas.openxmlformats.org/presentationml/2006/main">
+  <p:cSld>
+    <p:spTree>
+      <p:nvGrpSpPr>
+        <p:cNvPr id="1" name="">
+          <a:extLst>
+            <a:ext uri="{FF2B5EF4-FFF2-40B4-BE49-F238E27FC236}">
+              <a16:creationId xmlns:a16="http://schemas.microsoft.com/office/drawing/2014/main" id="{BA2EF304-631B-52E4-E344-658232AE9559}"/>
+            </a:ext>
+          </a:extLst>
+        </p:cNvPr>
+        <p:cNvGrpSpPr/>
+        <p:nvPr/>
+      </p:nvGrpSpPr>
+      <p:grpSpPr>
+        <a:xfrm>
+          <a:off x="0" y="0"/>
+          <a:ext cx="0" cy="0"/>
+          <a:chOff x="0" y="0"/>
+          <a:chExt cx="0" cy="0"/>
+        </a:xfrm>
+      </p:grpSpPr>
+      <p:sp>
+        <p:nvSpPr>
+          <p:cNvPr id="2" name="Slide Image Placeholder 1">
+            <a:extLst>
+              <a:ext uri="{FF2B5EF4-FFF2-40B4-BE49-F238E27FC236}">
+                <a16:creationId xmlns:a16="http://schemas.microsoft.com/office/drawing/2014/main" id="{6092A46C-532F-1F36-59D6-B2A291274DF7}"/>
+              </a:ext>
+            </a:extLst>
+          </p:cNvPr>
+          <p:cNvSpPr>
+            <a:spLocks noGrp="1" noRot="1" noChangeAspect="1"/>
+          </p:cNvSpPr>
+          <p:nvPr>
+            <p:ph type="sldImg"/>
+          </p:nvPr>
+        </p:nvSpPr>
+        <p:spPr/>
+      </p:sp>
+      <p:sp>
+        <p:nvSpPr>
+          <p:cNvPr id="3" name="Notes Placeholder 2">
+            <a:extLst>
+              <a:ext uri="{FF2B5EF4-FFF2-40B4-BE49-F238E27FC236}">
+                <a16:creationId xmlns:a16="http://schemas.microsoft.com/office/drawing/2014/main" id="{E121AFD5-B0FB-CB2B-F745-2641F2068508}"/>
+              </a:ext>
+            </a:extLst>
+          </p:cNvPr>
+          <p:cNvSpPr>
+            <a:spLocks noGrp="1"/>
+          </p:cNvSpPr>
+          <p:nvPr>
+            <p:ph type="body" idx="1"/>
+          </p:nvPr>
+        </p:nvSpPr>
+        <p:spPr/>
+        <p:txBody>
+          <a:bodyPr/>
+          <a:lstStyle/>
+          <a:p>
+            <a:endParaRPr lang="en-US" dirty="0"/>
+          </a:p>
+        </p:txBody>
+      </p:sp>
+      <p:sp>
+        <p:nvSpPr>
+          <p:cNvPr id="4" name="Slide Number Placeholder 3">
+            <a:extLst>
+              <a:ext uri="{FF2B5EF4-FFF2-40B4-BE49-F238E27FC236}">
+                <a16:creationId xmlns:a16="http://schemas.microsoft.com/office/drawing/2014/main" id="{9546E851-45FB-1D75-9C4D-EA574EFFB23E}"/>
+              </a:ext>
+            </a:extLst>
+          </p:cNvPr>
+          <p:cNvSpPr>
+            <a:spLocks noGrp="1"/>
+          </p:cNvSpPr>
+          <p:nvPr>
+            <p:ph type="sldNum" sz="quarter" idx="10"/>
+          </p:nvPr>
+        </p:nvSpPr>
+        <p:spPr/>
+        <p:txBody>
+          <a:bodyPr/>
+          <a:lstStyle/>
+          <a:p>
+            <a:fld id="{F7021451-1387-4CA6-816F-3879F97B5CBC}" type="slidenum">
+              <a:rPr lang="en-US"/>
+              <a:t>7</a:t>
+            </a:fld>
+            <a:endParaRPr lang="en-US"/>
+          </a:p>
+        </p:txBody>
+      </p:sp>
+    </p:spTree>
+    <p:extLst>
+      <p:ext uri="{BB962C8B-B14F-4D97-AF65-F5344CB8AC3E}">
+        <p14:creationId xmlns:p14="http://schemas.microsoft.com/office/powerpoint/2010/main" val="1211206433"/>
+      </p:ext>
+    </p:extLst>
+  </p:cSld>
+  <p:clrMapOvr>
+    <a:masterClrMapping/>
+  </p:clrMapOvr>
+</p:notes>
+</file>
+
+<file path=ppt/notesSlides/notesSlide8.xml><?xml version="1.0" encoding="utf-8"?>
+<p:notes xmlns:a="http://schemas.openxmlformats.org/drawingml/2006/main" xmlns:r="http://schemas.openxmlformats.org/officeDocument/2006/relationships" xmlns:p="http://schemas.openxmlformats.org/presentationml/2006/main">
+  <p:cSld>
+    <p:spTree>
+      <p:nvGrpSpPr>
+        <p:cNvPr id="1" name="">
+          <a:extLst>
+            <a:ext uri="{FF2B5EF4-FFF2-40B4-BE49-F238E27FC236}">
+              <a16:creationId xmlns:a16="http://schemas.microsoft.com/office/drawing/2014/main" id="{2988EAB4-4A39-A84E-64F5-255A52EE638C}"/>
+            </a:ext>
+          </a:extLst>
+        </p:cNvPr>
+        <p:cNvGrpSpPr/>
+        <p:nvPr/>
+      </p:nvGrpSpPr>
+      <p:grpSpPr>
+        <a:xfrm>
+          <a:off x="0" y="0"/>
+          <a:ext cx="0" cy="0"/>
+          <a:chOff x="0" y="0"/>
+          <a:chExt cx="0" cy="0"/>
+        </a:xfrm>
+      </p:grpSpPr>
+      <p:sp>
+        <p:nvSpPr>
+          <p:cNvPr id="2" name="Slide Image Placeholder 1">
+            <a:extLst>
+              <a:ext uri="{FF2B5EF4-FFF2-40B4-BE49-F238E27FC236}">
+                <a16:creationId xmlns:a16="http://schemas.microsoft.com/office/drawing/2014/main" id="{C5BBAB18-9D42-31E2-4EE5-01895188C5C9}"/>
+              </a:ext>
+            </a:extLst>
+          </p:cNvPr>
+          <p:cNvSpPr>
+            <a:spLocks noGrp="1" noRot="1" noChangeAspect="1"/>
+          </p:cNvSpPr>
+          <p:nvPr>
+            <p:ph type="sldImg"/>
+          </p:nvPr>
+        </p:nvSpPr>
+        <p:spPr/>
+      </p:sp>
+      <p:sp>
+        <p:nvSpPr>
+          <p:cNvPr id="3" name="Notes Placeholder 2">
+            <a:extLst>
+              <a:ext uri="{FF2B5EF4-FFF2-40B4-BE49-F238E27FC236}">
+                <a16:creationId xmlns:a16="http://schemas.microsoft.com/office/drawing/2014/main" id="{83CBD25F-3400-86AD-7C19-D2E1A50855F3}"/>
+              </a:ext>
+            </a:extLst>
+          </p:cNvPr>
+          <p:cNvSpPr>
+            <a:spLocks noGrp="1"/>
+          </p:cNvSpPr>
+          <p:nvPr>
+            <p:ph type="body" idx="1"/>
+          </p:nvPr>
+        </p:nvSpPr>
+        <p:spPr/>
+        <p:txBody>
+          <a:bodyPr/>
+          <a:lstStyle/>
+          <a:p>
+            <a:endParaRPr lang="en-US" dirty="0"/>
+          </a:p>
+        </p:txBody>
+      </p:sp>
+      <p:sp>
+        <p:nvSpPr>
+          <p:cNvPr id="4" name="Slide Number Placeholder 3">
+            <a:extLst>
+              <a:ext uri="{FF2B5EF4-FFF2-40B4-BE49-F238E27FC236}">
+                <a16:creationId xmlns:a16="http://schemas.microsoft.com/office/drawing/2014/main" id="{9B3D3F78-B026-A7DB-33A3-4B1D7EF33551}"/>
+              </a:ext>
+            </a:extLst>
+          </p:cNvPr>
+          <p:cNvSpPr>
+            <a:spLocks noGrp="1"/>
+          </p:cNvSpPr>
+          <p:nvPr>
+            <p:ph type="sldNum" sz="quarter" idx="10"/>
+          </p:nvPr>
+        </p:nvSpPr>
+        <p:spPr/>
+        <p:txBody>
+          <a:bodyPr/>
+          <a:lstStyle/>
+          <a:p>
+            <a:fld id="{F7021451-1387-4CA6-816F-3879F97B5CBC}" type="slidenum">
+              <a:rPr lang="en-US"/>
+              <a:t>8</a:t>
+            </a:fld>
+            <a:endParaRPr lang="en-US"/>
+          </a:p>
+        </p:txBody>
+      </p:sp>
+    </p:spTree>
+    <p:extLst>
+      <p:ext uri="{BB962C8B-B14F-4D97-AF65-F5344CB8AC3E}">
+        <p14:creationId xmlns:p14="http://schemas.microsoft.com/office/powerpoint/2010/main" val="2032258993"/>
+      </p:ext>
+    </p:extLst>
+  </p:cSld>
+  <p:clrMapOvr>
+    <a:masterClrMapping/>
+  </p:clrMapOvr>
+</p:notes>
+</file>
+
 <file path=ppt/slideLayouts/slideLayout1.xml><?xml version="1.0" encoding="utf-8"?>
 <p:sldLayout xmlns:a="http://schemas.openxmlformats.org/drawingml/2006/main" xmlns:r="http://schemas.openxmlformats.org/officeDocument/2006/relationships" xmlns:p="http://schemas.openxmlformats.org/presentationml/2006/main" preserve="1">
   <p:cSld name="DEFAULT">
@@ -889,11 +1107,57 @@
           </a:prstGeom>
         </p:spPr>
       </p:pic>
+      <p:pic>
+        <p:nvPicPr>
+          <p:cNvPr id="6" name="Picture 5" descr="A logo with blue and yellow colors&#10;&#10;Description automatically generated">
+            <a:extLst>
+              <a:ext uri="{FF2B5EF4-FFF2-40B4-BE49-F238E27FC236}">
+                <a16:creationId xmlns:a16="http://schemas.microsoft.com/office/drawing/2014/main" id="{EF6A83E3-B36A-CA92-4A59-CA519844420F}"/>
+              </a:ext>
+            </a:extLst>
+          </p:cNvPr>
+          <p:cNvPicPr>
+            <a:picLocks noChangeAspect="1"/>
+          </p:cNvPicPr>
+          <p:nvPr userDrawn="1"/>
+        </p:nvPicPr>
+        <p:blipFill>
+          <a:blip r:embed="rId4"/>
+          <a:stretch>
+            <a:fillRect/>
+          </a:stretch>
+        </p:blipFill>
+        <p:spPr>
+          <a:xfrm>
+            <a:off x="13992952" y="68580"/>
+            <a:ext cx="459538" cy="825942"/>
+          </a:xfrm>
+          <a:prstGeom prst="rect">
+            <a:avLst/>
+          </a:prstGeom>
+        </p:spPr>
+      </p:pic>
     </p:spTree>
   </p:cSld>
   <p:clrMapOvr>
     <a:masterClrMapping/>
   </p:clrMapOvr>
+  <p:extLst>
+    <p:ext uri="{DCECCB84-F9BA-43D5-87BE-67443E8EF086}">
+      <p15:sldGuideLst xmlns:p15="http://schemas.microsoft.com/office/powerpoint/2012/main">
+        <p15:guide id="1" orient="horz" pos="2592" userDrawn="1">
+          <p15:clr>
+            <a:srgbClr val="FBAE40"/>
+          </p15:clr>
+        </p15:guide>
+        <p15:guide id="2" pos="4608" userDrawn="1">
+          <p15:clr>
+            <a:srgbClr val="FBAE40"/>
+          </p15:clr>
+        </p15:guide>
+      </p15:sldGuideLst>
+    </p:ext>
+  </p:extLst>
 </p:sldLayout>
 </file>
 
@@ -982,6 +1246,36 @@
           <a:xfrm>
             <a:off x="12839215" y="7749540"/>
             <a:ext cx="1722605" cy="411480"/>
+          </a:xfrm>
+          <a:prstGeom prst="rect">
+            <a:avLst/>
+          </a:prstGeom>
+        </p:spPr>
+      </p:pic>
+      <p:pic>
+        <p:nvPicPr>
+          <p:cNvPr id="5" name="Picture 4" descr="A logo with blue and yellow colors&#10;&#10;Description automatically generated">
+            <a:extLst>
+              <a:ext uri="{FF2B5EF4-FFF2-40B4-BE49-F238E27FC236}">
+                <a16:creationId xmlns:a16="http://schemas.microsoft.com/office/drawing/2014/main" id="{85E768ED-2372-D2FA-DD47-E70E224D0D9A}"/>
+              </a:ext>
+            </a:extLst>
+          </p:cNvPr>
+          <p:cNvPicPr>
+            <a:picLocks noChangeAspect="1"/>
+          </p:cNvPicPr>
+          <p:nvPr userDrawn="1"/>
+        </p:nvPicPr>
+        <p:blipFill>
+          <a:blip r:embed="rId4"/>
+          <a:stretch>
+            <a:fillRect/>
+          </a:stretch>
+        </p:blipFill>
+        <p:spPr>
+          <a:xfrm>
+            <a:off x="13992952" y="68580"/>
+            <a:ext cx="459538" cy="825942"/>
           </a:xfrm>
           <a:prstGeom prst="rect">
             <a:avLst/>
@@ -1087,6 +1381,36 @@
           </a:prstGeom>
         </p:spPr>
       </p:pic>
+      <p:pic>
+        <p:nvPicPr>
+          <p:cNvPr id="5" name="Picture 4" descr="A logo with blue and yellow colors&#10;&#10;Description automatically generated">
+            <a:extLst>
+              <a:ext uri="{FF2B5EF4-FFF2-40B4-BE49-F238E27FC236}">
+                <a16:creationId xmlns:a16="http://schemas.microsoft.com/office/drawing/2014/main" id="{029B6AAC-0F9C-FAFC-C06A-DD55CC881F98}"/>
+              </a:ext>
+            </a:extLst>
+          </p:cNvPr>
+          <p:cNvPicPr>
+            <a:picLocks noChangeAspect="1"/>
+          </p:cNvPicPr>
+          <p:nvPr userDrawn="1"/>
+        </p:nvPicPr>
+        <p:blipFill>
+          <a:blip r:embed="rId4"/>
+          <a:stretch>
+            <a:fillRect/>
+          </a:stretch>
+        </p:blipFill>
+        <p:spPr>
+          <a:xfrm>
+            <a:off x="13992952" y="68580"/>
+            <a:ext cx="459538" cy="825942"/>
+          </a:xfrm>
+          <a:prstGeom prst="rect">
+            <a:avLst/>
+          </a:prstGeom>
+        </p:spPr>
+      </p:pic>
     </p:spTree>
   </p:cSld>
   <p:clrMapOvr>
@@ -1180,6 +1504,36 @@
           <a:xfrm>
             <a:off x="12839215" y="7749540"/>
             <a:ext cx="1722605" cy="411480"/>
+          </a:xfrm>
+          <a:prstGeom prst="rect">
+            <a:avLst/>
+          </a:prstGeom>
+        </p:spPr>
+      </p:pic>
+      <p:pic>
+        <p:nvPicPr>
+          <p:cNvPr id="5" name="Picture 4" descr="A logo with blue and yellow colors&#10;&#10;Description automatically generated">
+            <a:extLst>
+              <a:ext uri="{FF2B5EF4-FFF2-40B4-BE49-F238E27FC236}">
+                <a16:creationId xmlns:a16="http://schemas.microsoft.com/office/drawing/2014/main" id="{DE0B72CE-8C58-B7C4-D285-B20A895F820C}"/>
+              </a:ext>
+            </a:extLst>
+          </p:cNvPr>
+          <p:cNvPicPr>
+            <a:picLocks noChangeAspect="1"/>
+          </p:cNvPicPr>
+          <p:nvPr userDrawn="1"/>
+        </p:nvPicPr>
+        <p:blipFill>
+          <a:blip r:embed="rId4"/>
+          <a:stretch>
+            <a:fillRect/>
+          </a:stretch>
+        </p:blipFill>
+        <p:spPr>
+          <a:xfrm>
+            <a:off x="13992952" y="68580"/>
+            <a:ext cx="459538" cy="825942"/>
           </a:xfrm>
           <a:prstGeom prst="rect">
             <a:avLst/>
@@ -1285,6 +1639,36 @@
           </a:prstGeom>
         </p:spPr>
       </p:pic>
+      <p:pic>
+        <p:nvPicPr>
+          <p:cNvPr id="5" name="Picture 4" descr="A logo with blue and yellow colors&#10;&#10;Description automatically generated">
+            <a:extLst>
+              <a:ext uri="{FF2B5EF4-FFF2-40B4-BE49-F238E27FC236}">
+                <a16:creationId xmlns:a16="http://schemas.microsoft.com/office/drawing/2014/main" id="{FC4F2E73-556A-2FA7-C796-1E99B648F4AB}"/>
+              </a:ext>
+            </a:extLst>
+          </p:cNvPr>
+          <p:cNvPicPr>
+            <a:picLocks noChangeAspect="1"/>
+          </p:cNvPicPr>
+          <p:nvPr userDrawn="1"/>
+        </p:nvPicPr>
+        <p:blipFill>
+          <a:blip r:embed="rId4"/>
+          <a:stretch>
+            <a:fillRect/>
+          </a:stretch>
+        </p:blipFill>
+        <p:spPr>
+          <a:xfrm>
+            <a:off x="13992952" y="68580"/>
+            <a:ext cx="459538" cy="825942"/>
+          </a:xfrm>
+          <a:prstGeom prst="rect">
+            <a:avLst/>
+          </a:prstGeom>
+        </p:spPr>
+      </p:pic>
     </p:spTree>
   </p:cSld>
   <p:clrMapOvr>
@@ -1384,6 +1768,36 @@
           </a:prstGeom>
         </p:spPr>
       </p:pic>
+      <p:pic>
+        <p:nvPicPr>
+          <p:cNvPr id="5" name="Picture 4" descr="A logo with blue and yellow colors&#10;&#10;Description automatically generated">
+            <a:extLst>
+              <a:ext uri="{FF2B5EF4-FFF2-40B4-BE49-F238E27FC236}">
+                <a16:creationId xmlns:a16="http://schemas.microsoft.com/office/drawing/2014/main" id="{951E9446-29DF-C2E4-64FE-A35EABCE1D5D}"/>
+              </a:ext>
+            </a:extLst>
+          </p:cNvPr>
+          <p:cNvPicPr>
+            <a:picLocks noChangeAspect="1"/>
+          </p:cNvPicPr>
+          <p:nvPr userDrawn="1"/>
+        </p:nvPicPr>
+        <p:blipFill>
+          <a:blip r:embed="rId4"/>
+          <a:stretch>
+            <a:fillRect/>
+          </a:stretch>
+        </p:blipFill>
+        <p:spPr>
+          <a:xfrm>
+            <a:off x="13992952" y="68580"/>
+            <a:ext cx="459538" cy="825942"/>
+          </a:xfrm>
+          <a:prstGeom prst="rect">
+            <a:avLst/>
+          </a:prstGeom>
+        </p:spPr>
+      </p:pic>
     </p:spTree>
   </p:cSld>
   <p:clrMapOvr>
@@ -1414,6 +1828,36 @@
           <a:chExt cx="0" cy="0"/>
         </a:xfrm>
       </p:grpSpPr>
+      <p:pic>
+        <p:nvPicPr>
+          <p:cNvPr id="2" name="Picture 1" descr="A logo with blue and yellow colors&#10;&#10;Description automatically generated">
+            <a:extLst>
+              <a:ext uri="{FF2B5EF4-FFF2-40B4-BE49-F238E27FC236}">
+                <a16:creationId xmlns:a16="http://schemas.microsoft.com/office/drawing/2014/main" id="{6DCC9FC5-B687-CCDD-9A6E-1BE032F166EF}"/>
+              </a:ext>
+            </a:extLst>
+          </p:cNvPr>
+          <p:cNvPicPr>
+            <a:picLocks noChangeAspect="1"/>
+          </p:cNvPicPr>
+          <p:nvPr userDrawn="1"/>
+        </p:nvPicPr>
+        <p:blipFill>
+          <a:blip r:embed="rId9"/>
+          <a:stretch>
+            <a:fillRect/>
+          </a:stretch>
+        </p:blipFill>
+        <p:spPr>
+          <a:xfrm>
+            <a:off x="13992952" y="68580"/>
+            <a:ext cx="459538" cy="825942"/>
+          </a:xfrm>
+          <a:prstGeom prst="rect">
+            <a:avLst/>
+          </a:prstGeom>
+        </p:spPr>
+      </p:pic>
     </p:spTree>
   </p:cSld>
   <p:clrMap bg1="lt1" tx1="dk1" bg2="lt2" tx2="dk2" accent1="accent1" accent2="accent2" accent3="accent3" accent4="accent4" accent5="accent5" accent6="accent6" hlink="hlink" folHlink="folHlink"/>
@@ -1677,6 +2121,22 @@
       </a:lvl9pPr>
     </p:otherStyle>
   </p:txStyles>
+  <p:extLst>
+    <p:ext uri="{27BBF7A9-308A-43DC-89C8-2F10F3537804}">
+      <p15:sldGuideLst xmlns:p15="http://schemas.microsoft.com/office/powerpoint/2012/main">
+        <p15:guide id="1" orient="horz" pos="2592" userDrawn="1">
+          <p15:clr>
+            <a:srgbClr val="F26B43"/>
+          </p15:clr>
+        </p15:guide>
+        <p15:guide id="2" pos="4608" userDrawn="1">
+          <p15:clr>
+            <a:srgbClr val="F26B43"/>
+          </p15:clr>
+        </p15:guide>
+      </p15:sldGuideLst>
+    </p:ext>
+  </p:extLst>
 </p:sldMaster>
 </file>
 
@@ -2355,7 +2815,7 @@
         </p:nvGrpSpPr>
         <p:grpSpPr>
           <a:xfrm>
-            <a:off x="4963897" y="3507706"/>
+            <a:off x="4824044" y="3472696"/>
             <a:ext cx="3664863" cy="1942028"/>
             <a:chOff x="4777979" y="3140298"/>
             <a:chExt cx="3664863" cy="1942028"/>
@@ -2532,7 +2992,7 @@
         </p:nvGrpSpPr>
         <p:grpSpPr>
           <a:xfrm>
-            <a:off x="2663749" y="6014618"/>
+            <a:off x="417506" y="6014618"/>
             <a:ext cx="4250765" cy="1857018"/>
             <a:chOff x="4685467" y="5555850"/>
             <a:chExt cx="3664863" cy="1942028"/>
@@ -2695,6 +3155,206 @@
           </p:txBody>
         </p:sp>
       </p:grpSp>
+      <p:grpSp>
+        <p:nvGrpSpPr>
+          <p:cNvPr id="24" name="Group 23">
+            <a:extLst>
+              <a:ext uri="{FF2B5EF4-FFF2-40B4-BE49-F238E27FC236}">
+                <a16:creationId xmlns:a16="http://schemas.microsoft.com/office/drawing/2014/main" id="{35122D59-6964-D818-1EA5-EE7FE306E18E}"/>
+              </a:ext>
+            </a:extLst>
+          </p:cNvPr>
+          <p:cNvGrpSpPr/>
+          <p:nvPr/>
+        </p:nvGrpSpPr>
+        <p:grpSpPr>
+          <a:xfrm>
+            <a:off x="4724342" y="5938418"/>
+            <a:ext cx="4250765" cy="1857018"/>
+            <a:chOff x="4685467" y="5555850"/>
+            <a:chExt cx="3664863" cy="1942028"/>
+          </a:xfrm>
+        </p:grpSpPr>
+        <p:sp>
+          <p:nvSpPr>
+            <p:cNvPr id="25" name="Shape 13">
+              <a:extLst>
+                <a:ext uri="{FF2B5EF4-FFF2-40B4-BE49-F238E27FC236}">
+                  <a16:creationId xmlns:a16="http://schemas.microsoft.com/office/drawing/2014/main" id="{711A76FB-9A9E-3A43-9081-CAC7542BF4AF}"/>
+                </a:ext>
+              </a:extLst>
+            </p:cNvPr>
+            <p:cNvSpPr/>
+            <p:nvPr/>
+          </p:nvSpPr>
+          <p:spPr>
+            <a:xfrm>
+              <a:off x="4685467" y="5555850"/>
+              <a:ext cx="510302" cy="510302"/>
+            </a:xfrm>
+            <a:prstGeom prst="roundRect">
+              <a:avLst>
+                <a:gd name="adj" fmla="val 6667"/>
+              </a:avLst>
+            </a:prstGeom>
+            <a:solidFill>
+              <a:srgbClr val="F3EEE3"/>
+            </a:solidFill>
+            <a:ln/>
+          </p:spPr>
+          <p:txBody>
+            <a:bodyPr/>
+            <a:lstStyle/>
+            <a:p>
+              <a:endParaRPr lang="en-IL"/>
+            </a:p>
+          </p:txBody>
+        </p:sp>
+        <p:sp>
+          <p:nvSpPr>
+            <p:cNvPr id="26" name="Text 14">
+              <a:extLst>
+                <a:ext uri="{FF2B5EF4-FFF2-40B4-BE49-F238E27FC236}">
+                  <a16:creationId xmlns:a16="http://schemas.microsoft.com/office/drawing/2014/main" id="{05E0F017-0D55-CCCA-B81F-F2B764E48AF4}"/>
+                </a:ext>
+              </a:extLst>
+            </p:cNvPr>
+            <p:cNvSpPr/>
+            <p:nvPr/>
+          </p:nvSpPr>
+          <p:spPr>
+            <a:xfrm>
+              <a:off x="4831080" y="5640860"/>
+              <a:ext cx="219075" cy="340281"/>
+            </a:xfrm>
+            <a:prstGeom prst="rect">
+              <a:avLst/>
+            </a:prstGeom>
+            <a:noFill/>
+            <a:ln/>
+          </p:spPr>
+          <p:txBody>
+            <a:bodyPr wrap="none" lIns="0" tIns="0" rIns="0" bIns="0" rtlCol="0" anchor="t"/>
+            <a:lstStyle/>
+            <a:p>
+              <a:pPr marL="0" indent="0" algn="ctr">
+                <a:lnSpc>
+                  <a:spcPts val="2650"/>
+                </a:lnSpc>
+                <a:buNone/>
+              </a:pPr>
+              <a:r>
+                <a:rPr lang="en-US" sz="2650" dirty="0">
+                  <a:solidFill>
+                    <a:srgbClr val="2B4150"/>
+                  </a:solidFill>
+                  <a:latin typeface="MuseoModerno Medium" pitchFamily="34" charset="0"/>
+                </a:rPr>
+                <a:t>4</a:t>
+              </a:r>
+              <a:endParaRPr lang="en-US" sz="2650" dirty="0"/>
+            </a:p>
+          </p:txBody>
+        </p:sp>
+        <p:sp>
+          <p:nvSpPr>
+            <p:cNvPr id="27" name="Text 15">
+              <a:extLst>
+                <a:ext uri="{FF2B5EF4-FFF2-40B4-BE49-F238E27FC236}">
+                  <a16:creationId xmlns:a16="http://schemas.microsoft.com/office/drawing/2014/main" id="{26069564-7AC5-81E4-BF40-801A0AB00697}"/>
+                </a:ext>
+              </a:extLst>
+            </p:cNvPr>
+            <p:cNvSpPr/>
+            <p:nvPr/>
+          </p:nvSpPr>
+          <p:spPr>
+            <a:xfrm>
+              <a:off x="5422583" y="5555850"/>
+              <a:ext cx="2835235" cy="354330"/>
+            </a:xfrm>
+            <a:prstGeom prst="rect">
+              <a:avLst/>
+            </a:prstGeom>
+            <a:noFill/>
+            <a:ln/>
+          </p:spPr>
+          <p:txBody>
+            <a:bodyPr wrap="none" lIns="0" tIns="0" rIns="0" bIns="0" rtlCol="0" anchor="t"/>
+            <a:lstStyle/>
+            <a:p>
+              <a:pPr marL="0" indent="0">
+                <a:lnSpc>
+                  <a:spcPts val="2750"/>
+                </a:lnSpc>
+                <a:buNone/>
+              </a:pPr>
+              <a:r>
+                <a:rPr lang="en-US" sz="2200" dirty="0" err="1">
+                  <a:solidFill>
+                    <a:srgbClr val="2B4150"/>
+                  </a:solidFill>
+                  <a:latin typeface="Mongolian Baiti" panose="03000500000000000000" pitchFamily="66" charset="0"/>
+                  <a:cs typeface="Mongolian Baiti" panose="03000500000000000000" pitchFamily="66" charset="0"/>
+                </a:rPr>
+                <a:t>os</a:t>
+              </a:r>
+              <a:endParaRPr lang="en-US" sz="2200" dirty="0">
+                <a:latin typeface="Mongolian Baiti" panose="03000500000000000000" pitchFamily="66" charset="0"/>
+                <a:cs typeface="Mongolian Baiti" panose="03000500000000000000" pitchFamily="66" charset="0"/>
+              </a:endParaRPr>
+            </a:p>
+          </p:txBody>
+        </p:sp>
+        <p:sp>
+          <p:nvSpPr>
+            <p:cNvPr id="28" name="Text 16">
+              <a:extLst>
+                <a:ext uri="{FF2B5EF4-FFF2-40B4-BE49-F238E27FC236}">
+                  <a16:creationId xmlns:a16="http://schemas.microsoft.com/office/drawing/2014/main" id="{050CA666-B880-49AE-2258-93361D5FAC95}"/>
+                </a:ext>
+              </a:extLst>
+            </p:cNvPr>
+            <p:cNvSpPr/>
+            <p:nvPr/>
+          </p:nvSpPr>
+          <p:spPr>
+            <a:xfrm>
+              <a:off x="5422583" y="6046268"/>
+              <a:ext cx="2927747" cy="1451610"/>
+            </a:xfrm>
+            <a:prstGeom prst="rect">
+              <a:avLst/>
+            </a:prstGeom>
+            <a:noFill/>
+            <a:ln/>
+          </p:spPr>
+          <p:txBody>
+            <a:bodyPr wrap="square" lIns="0" tIns="0" rIns="0" bIns="0" rtlCol="0" anchor="t"/>
+            <a:lstStyle/>
+            <a:p>
+              <a:pPr marL="0" indent="0">
+                <a:lnSpc>
+                  <a:spcPts val="2850"/>
+                </a:lnSpc>
+                <a:buNone/>
+              </a:pPr>
+              <a:r>
+                <a:rPr lang="en-US" sz="1750" dirty="0">
+                  <a:solidFill>
+                    <a:srgbClr val="2B4150"/>
+                  </a:solidFill>
+                  <a:latin typeface="Source Sans Pro" pitchFamily="34" charset="0"/>
+                  <a:ea typeface="Source Sans Pro" pitchFamily="34" charset="-122"/>
+                  <a:cs typeface="Source Sans Pro" pitchFamily="34" charset="-120"/>
+                </a:rPr>
+                <a:t>provides functions to interact with the operating system, enabling file, directory, and process management in a cross-platform way.</a:t>
+              </a:r>
+              <a:endParaRPr lang="en-US" sz="1750" dirty="0"/>
+            </a:p>
+          </p:txBody>
+        </p:sp>
+      </p:grpSp>
     </p:spTree>
   </p:cSld>
   <p:clrMapOvr>
@@ -3188,7 +3848,7 @@
             <a:r>
               <a:rPr lang="en-US" sz="2400" dirty="0">
                 <a:solidFill>
-                  <a:srgbClr val="2B4150"/>
+                  <a:srgbClr val="C00000"/>
                 </a:solidFill>
                 <a:latin typeface="Source Sans Pro" pitchFamily="34" charset="0"/>
                 <a:ea typeface="Source Sans Pro" pitchFamily="34" charset="-122"/>
@@ -3196,7 +3856,11 @@
               </a:rPr>
               <a:t>Search Term Verification-dress</a:t>
             </a:r>
-            <a:endParaRPr lang="en-US" sz="2400" dirty="0"/>
+            <a:endParaRPr lang="en-US" sz="2400" dirty="0">
+              <a:solidFill>
+                <a:srgbClr val="C00000"/>
+              </a:solidFill>
+            </a:endParaRPr>
           </a:p>
         </p:txBody>
       </p:sp>
@@ -3704,7 +4368,7 @@
             <a:r>
               <a:rPr lang="en-US" sz="1750" dirty="0">
                 <a:solidFill>
-                  <a:srgbClr val="2B4150"/>
+                  <a:srgbClr val="C00000"/>
                 </a:solidFill>
                 <a:latin typeface="Source Sans Pro" pitchFamily="34" charset="0"/>
                 <a:ea typeface="Source Sans Pro" pitchFamily="34" charset="-122"/>
@@ -4529,7 +5193,7 @@
             <a:r>
               <a:rPr lang="en-US" sz="1750" dirty="0">
                 <a:solidFill>
-                  <a:srgbClr val="2B4150"/>
+                  <a:srgbClr val="C00000"/>
                 </a:solidFill>
                 <a:latin typeface="Source Sans Pro" pitchFamily="34" charset="0"/>
                 <a:ea typeface="Source Sans Pro" pitchFamily="34" charset="-122"/>
@@ -4537,7 +5201,11 @@
               </a:rPr>
               <a:t>Login while Checkout</a:t>
             </a:r>
-            <a:endParaRPr lang="en-US" sz="1750" dirty="0"/>
+            <a:endParaRPr lang="en-US" sz="1750" dirty="0">
+              <a:solidFill>
+                <a:srgbClr val="C00000"/>
+              </a:solidFill>
+            </a:endParaRPr>
           </a:p>
         </p:txBody>
       </p:sp>
@@ -5105,9 +5773,220 @@
           <a:chExt cx="0" cy="0"/>
         </a:xfrm>
       </p:grpSpPr>
+      <p:sp>
+        <p:nvSpPr>
+          <p:cNvPr id="3" name="Text 0"/>
+          <p:cNvSpPr/>
+          <p:nvPr/>
+        </p:nvSpPr>
+        <p:spPr>
+          <a:xfrm>
+            <a:off x="6037348" y="3090335"/>
+            <a:ext cx="2540118" cy="708779"/>
+          </a:xfrm>
+          <a:prstGeom prst="rect">
+            <a:avLst/>
+          </a:prstGeom>
+          <a:noFill/>
+          <a:ln/>
+        </p:spPr>
+        <p:txBody>
+          <a:bodyPr wrap="none" lIns="0" tIns="0" rIns="0" bIns="0" rtlCol="0" anchor="t"/>
+          <a:lstStyle/>
+          <a:p>
+            <a:pPr marL="0" indent="0">
+              <a:lnSpc>
+                <a:spcPts val="5550"/>
+              </a:lnSpc>
+              <a:buNone/>
+            </a:pPr>
+            <a:r>
+              <a:rPr lang="en-US" sz="8800" dirty="0">
+                <a:solidFill>
+                  <a:srgbClr val="124E73"/>
+                </a:solidFill>
+                <a:latin typeface="Mongolian Baiti" panose="03000500000000000000" pitchFamily="66" charset="0"/>
+                <a:ea typeface="MuseoModerno Medium" pitchFamily="34" charset="-122"/>
+                <a:cs typeface="Mongolian Baiti" panose="03000500000000000000" pitchFamily="66" charset="0"/>
+              </a:rPr>
+              <a:t>demo</a:t>
+            </a:r>
+            <a:endParaRPr lang="en-US" sz="8800" dirty="0">
+              <a:latin typeface="Mongolian Baiti" panose="03000500000000000000" pitchFamily="66" charset="0"/>
+              <a:cs typeface="Mongolian Baiti" panose="03000500000000000000" pitchFamily="66" charset="0"/>
+            </a:endParaRPr>
+          </a:p>
+        </p:txBody>
+      </p:sp>
+      <p:sp>
+        <p:nvSpPr>
+          <p:cNvPr id="4" name="Text 1"/>
+          <p:cNvSpPr/>
+          <p:nvPr/>
+        </p:nvSpPr>
+        <p:spPr>
+          <a:xfrm>
+            <a:off x="3536989" y="4234919"/>
+            <a:ext cx="7556421" cy="1088708"/>
+          </a:xfrm>
+          <a:prstGeom prst="rect">
+            <a:avLst/>
+          </a:prstGeom>
+          <a:noFill/>
+          <a:ln/>
+        </p:spPr>
+        <p:txBody>
+          <a:bodyPr wrap="square" lIns="0" tIns="0" rIns="0" bIns="0" rtlCol="0" anchor="t"/>
+          <a:lstStyle/>
+          <a:p>
+            <a:pPr marL="0" indent="0" algn="ctr">
+              <a:lnSpc>
+                <a:spcPts val="2850"/>
+              </a:lnSpc>
+              <a:buNone/>
+            </a:pPr>
+            <a:r>
+              <a:rPr lang="en-US" sz="2000" dirty="0">
+                <a:solidFill>
+                  <a:srgbClr val="2B4150"/>
+                </a:solidFill>
+                <a:latin typeface="Source Sans Pro" pitchFamily="34" charset="0"/>
+                <a:ea typeface="Source Sans Pro" pitchFamily="34" charset="-122"/>
+                <a:cs typeface="Source Sans Pro" pitchFamily="34" charset="-120"/>
+              </a:rPr>
+              <a:t>Now I will present some of the test preforming automatically, </a:t>
+            </a:r>
+          </a:p>
+          <a:p>
+            <a:pPr marL="0" indent="0" algn="ctr">
+              <a:lnSpc>
+                <a:spcPts val="2850"/>
+              </a:lnSpc>
+              <a:buNone/>
+            </a:pPr>
+            <a:r>
+              <a:rPr lang="en-US" sz="2000" dirty="0">
+                <a:solidFill>
+                  <a:srgbClr val="2B4150"/>
+                </a:solidFill>
+                <a:latin typeface="Source Sans Pro" pitchFamily="34" charset="0"/>
+                <a:ea typeface="Source Sans Pro" pitchFamily="34" charset="-122"/>
+              </a:rPr>
+              <a:t>Code is written in python </a:t>
+            </a:r>
+          </a:p>
+          <a:p>
+            <a:pPr marL="0" indent="0" algn="ctr">
+              <a:lnSpc>
+                <a:spcPts val="2850"/>
+              </a:lnSpc>
+              <a:buNone/>
+            </a:pPr>
+            <a:r>
+              <a:rPr lang="en-US" sz="2000" dirty="0">
+                <a:solidFill>
+                  <a:srgbClr val="2B4150"/>
+                </a:solidFill>
+                <a:latin typeface="Source Sans Pro" pitchFamily="34" charset="0"/>
+                <a:ea typeface="Source Sans Pro" pitchFamily="34" charset="-122"/>
+              </a:rPr>
+              <a:t>On Visual Studio Code </a:t>
+            </a:r>
+            <a:endParaRPr lang="en-US" sz="2000" dirty="0"/>
+          </a:p>
+        </p:txBody>
+      </p:sp>
+    </p:spTree>
+  </p:cSld>
+  <p:clrMapOvr>
+    <a:masterClrMapping/>
+  </p:clrMapOvr>
+</p:sld>
+</file>
+
+<file path=ppt/slides/slide7.xml><?xml version="1.0" encoding="utf-8"?>
+<p:sld xmlns:a="http://schemas.openxmlformats.org/drawingml/2006/main" xmlns:r="http://schemas.openxmlformats.org/officeDocument/2006/relationships" xmlns:p="http://schemas.openxmlformats.org/presentationml/2006/main">
+  <p:cSld>
+    <p:spTree>
+      <p:nvGrpSpPr>
+        <p:cNvPr id="1" name="">
+          <a:extLst>
+            <a:ext uri="{FF2B5EF4-FFF2-40B4-BE49-F238E27FC236}">
+              <a16:creationId xmlns:a16="http://schemas.microsoft.com/office/drawing/2014/main" id="{FEBB0783-DAB4-CFBF-1A63-725F1F635CDF}"/>
+            </a:ext>
+          </a:extLst>
+        </p:cNvPr>
+        <p:cNvGrpSpPr/>
+        <p:nvPr/>
+      </p:nvGrpSpPr>
+      <p:grpSpPr>
+        <a:xfrm>
+          <a:off x="0" y="0"/>
+          <a:ext cx="0" cy="0"/>
+          <a:chOff x="0" y="0"/>
+          <a:chExt cx="0" cy="0"/>
+        </a:xfrm>
+      </p:grpSpPr>
+      <p:sp>
+        <p:nvSpPr>
+          <p:cNvPr id="3" name="Text 0">
+            <a:extLst>
+              <a:ext uri="{FF2B5EF4-FFF2-40B4-BE49-F238E27FC236}">
+                <a16:creationId xmlns:a16="http://schemas.microsoft.com/office/drawing/2014/main" id="{4ADE58EF-A3A9-D047-A884-9995E09C731D}"/>
+              </a:ext>
+            </a:extLst>
+          </p:cNvPr>
+          <p:cNvSpPr/>
+          <p:nvPr/>
+        </p:nvSpPr>
+        <p:spPr>
+          <a:xfrm>
+            <a:off x="519960" y="1451113"/>
+            <a:ext cx="5790218" cy="1296632"/>
+          </a:xfrm>
+          <a:prstGeom prst="rect">
+            <a:avLst/>
+          </a:prstGeom>
+          <a:noFill/>
+          <a:ln/>
+        </p:spPr>
+        <p:txBody>
+          <a:bodyPr wrap="none" lIns="0" tIns="0" rIns="0" bIns="0" rtlCol="0" anchor="t"/>
+          <a:lstStyle/>
+          <a:p>
+            <a:pPr marL="0" indent="0">
+              <a:lnSpc>
+                <a:spcPts val="5550"/>
+              </a:lnSpc>
+              <a:buNone/>
+            </a:pPr>
+            <a:r>
+              <a:rPr lang="en-US" sz="8800" dirty="0">
+                <a:solidFill>
+                  <a:srgbClr val="124E73"/>
+                </a:solidFill>
+                <a:latin typeface="Mongolian Baiti" panose="03000500000000000000" pitchFamily="66" charset="0"/>
+                <a:ea typeface="MuseoModerno Medium" pitchFamily="34" charset="-122"/>
+                <a:cs typeface="Mongolian Baiti" panose="03000500000000000000" pitchFamily="66" charset="0"/>
+              </a:rPr>
+              <a:t>Html Report</a:t>
+            </a:r>
+            <a:endParaRPr lang="en-US" sz="8800" dirty="0">
+              <a:latin typeface="Mongolian Baiti" panose="03000500000000000000" pitchFamily="66" charset="0"/>
+              <a:cs typeface="Mongolian Baiti" panose="03000500000000000000" pitchFamily="66" charset="0"/>
+            </a:endParaRPr>
+          </a:p>
+        </p:txBody>
+      </p:sp>
       <p:pic>
         <p:nvPicPr>
-          <p:cNvPr id="2" name="Image 0" descr="preencoded.png"/>
+          <p:cNvPr id="5" name="Picture 4">
+            <a:extLst>
+              <a:ext uri="{FF2B5EF4-FFF2-40B4-BE49-F238E27FC236}">
+                <a16:creationId xmlns:a16="http://schemas.microsoft.com/office/drawing/2014/main" id="{AC4EE6D4-7466-F535-CEF1-C23772AA93F6}"/>
+              </a:ext>
+            </a:extLst>
+          </p:cNvPr>
           <p:cNvPicPr>
             <a:picLocks noChangeAspect="1"/>
           </p:cNvPicPr>
@@ -5121,102 +6000,2085 @@
         </p:blipFill>
         <p:spPr>
           <a:xfrm>
-            <a:off x="0" y="0"/>
-            <a:ext cx="5486400" cy="8229600"/>
+            <a:off x="6432098" y="758836"/>
+            <a:ext cx="7209408" cy="7002834"/>
           </a:xfrm>
           <a:prstGeom prst="rect">
             <a:avLst/>
           </a:prstGeom>
         </p:spPr>
       </p:pic>
-      <p:sp>
-        <p:nvSpPr>
-          <p:cNvPr id="3" name="Text 0"/>
+    </p:spTree>
+    <p:extLst>
+      <p:ext uri="{BB962C8B-B14F-4D97-AF65-F5344CB8AC3E}">
+        <p14:creationId xmlns:p14="http://schemas.microsoft.com/office/powerpoint/2010/main" val="2136667075"/>
+      </p:ext>
+    </p:extLst>
+  </p:cSld>
+  <p:clrMapOvr>
+    <a:masterClrMapping/>
+  </p:clrMapOvr>
+</p:sld>
+</file>
+
+<file path=ppt/slides/slide8.xml><?xml version="1.0" encoding="utf-8"?>
+<p:sld xmlns:a="http://schemas.openxmlformats.org/drawingml/2006/main" xmlns:r="http://schemas.openxmlformats.org/officeDocument/2006/relationships" xmlns:p="http://schemas.openxmlformats.org/presentationml/2006/main">
+  <p:cSld>
+    <p:spTree>
+      <p:nvGrpSpPr>
+        <p:cNvPr id="1" name="">
+          <a:extLst>
+            <a:ext uri="{FF2B5EF4-FFF2-40B4-BE49-F238E27FC236}">
+              <a16:creationId xmlns:a16="http://schemas.microsoft.com/office/drawing/2014/main" id="{BEB44A9A-B622-924C-5F37-A20F10218471}"/>
+            </a:ext>
+          </a:extLst>
+        </p:cNvPr>
+        <p:cNvGrpSpPr/>
+        <p:nvPr/>
+      </p:nvGrpSpPr>
+      <p:grpSpPr>
+        <a:xfrm>
+          <a:off x="0" y="0"/>
+          <a:ext cx="0" cy="0"/>
+          <a:chOff x="0" y="0"/>
+          <a:chExt cx="0" cy="0"/>
+        </a:xfrm>
+      </p:grpSpPr>
+      <p:pic>
+        <p:nvPicPr>
+          <p:cNvPr id="2" name="Image 0" descr="preencoded.png">
+            <a:extLst>
+              <a:ext uri="{FF2B5EF4-FFF2-40B4-BE49-F238E27FC236}">
+                <a16:creationId xmlns:a16="http://schemas.microsoft.com/office/drawing/2014/main" id="{2D049A28-A9A6-E8F5-199A-39B9F6AD3138}"/>
+              </a:ext>
+            </a:extLst>
+          </p:cNvPr>
+          <p:cNvPicPr>
+            <a:picLocks noChangeAspect="1"/>
+          </p:cNvPicPr>
+          <p:nvPr/>
+        </p:nvPicPr>
+        <p:blipFill>
+          <a:blip r:embed="rId3"/>
+          <a:stretch>
+            <a:fillRect/>
+          </a:stretch>
+        </p:blipFill>
+        <p:spPr>
+          <a:xfrm>
+            <a:off x="12065288" y="6420015"/>
+            <a:ext cx="645275" cy="1006252"/>
+          </a:xfrm>
+          <a:custGeom>
+            <a:avLst/>
+            <a:gdLst>
+              <a:gd name="connsiteX0" fmla="*/ 0 w 645275"/>
+              <a:gd name="connsiteY0" fmla="*/ 0 h 1006252"/>
+              <a:gd name="connsiteX1" fmla="*/ 645275 w 645275"/>
+              <a:gd name="connsiteY1" fmla="*/ 0 h 1006252"/>
+              <a:gd name="connsiteX2" fmla="*/ 645275 w 645275"/>
+              <a:gd name="connsiteY2" fmla="*/ 503126 h 1006252"/>
+              <a:gd name="connsiteX3" fmla="*/ 645275 w 645275"/>
+              <a:gd name="connsiteY3" fmla="*/ 1006252 h 1006252"/>
+              <a:gd name="connsiteX4" fmla="*/ 0 w 645275"/>
+              <a:gd name="connsiteY4" fmla="*/ 1006252 h 1006252"/>
+              <a:gd name="connsiteX5" fmla="*/ 0 w 645275"/>
+              <a:gd name="connsiteY5" fmla="*/ 533314 h 1006252"/>
+              <a:gd name="connsiteX6" fmla="*/ 0 w 645275"/>
+              <a:gd name="connsiteY6" fmla="*/ 0 h 1006252"/>
+            </a:gdLst>
+            <a:ahLst/>
+            <a:cxnLst>
+              <a:cxn ang="0">
+                <a:pos x="connsiteX0" y="connsiteY0"/>
+              </a:cxn>
+              <a:cxn ang="0">
+                <a:pos x="connsiteX1" y="connsiteY1"/>
+              </a:cxn>
+              <a:cxn ang="0">
+                <a:pos x="connsiteX2" y="connsiteY2"/>
+              </a:cxn>
+              <a:cxn ang="0">
+                <a:pos x="connsiteX3" y="connsiteY3"/>
+              </a:cxn>
+              <a:cxn ang="0">
+                <a:pos x="connsiteX4" y="connsiteY4"/>
+              </a:cxn>
+              <a:cxn ang="0">
+                <a:pos x="connsiteX5" y="connsiteY5"/>
+              </a:cxn>
+              <a:cxn ang="0">
+                <a:pos x="connsiteX6" y="connsiteY6"/>
+              </a:cxn>
+            </a:cxnLst>
+            <a:rect l="l" t="t" r="r" b="b"/>
+            <a:pathLst>
+              <a:path w="645275" h="1006252" fill="none" extrusionOk="0">
+                <a:moveTo>
+                  <a:pt x="0" y="0"/>
+                </a:moveTo>
+                <a:cubicBezTo>
+                  <a:pt x="236127" y="-14418"/>
+                  <a:pt x="343931" y="18241"/>
+                  <a:pt x="645275" y="0"/>
+                </a:cubicBezTo>
+                <a:cubicBezTo>
+                  <a:pt x="660279" y="205056"/>
+                  <a:pt x="648369" y="337904"/>
+                  <a:pt x="645275" y="503126"/>
+                </a:cubicBezTo>
+                <a:cubicBezTo>
+                  <a:pt x="642181" y="668348"/>
+                  <a:pt x="642924" y="858488"/>
+                  <a:pt x="645275" y="1006252"/>
+                </a:cubicBezTo>
+                <a:cubicBezTo>
+                  <a:pt x="344488" y="1010689"/>
+                  <a:pt x="299223" y="1031878"/>
+                  <a:pt x="0" y="1006252"/>
+                </a:cubicBezTo>
+                <a:cubicBezTo>
+                  <a:pt x="7922" y="861393"/>
+                  <a:pt x="656" y="765040"/>
+                  <a:pt x="0" y="533314"/>
+                </a:cubicBezTo>
+                <a:cubicBezTo>
+                  <a:pt x="-656" y="301588"/>
+                  <a:pt x="12295" y="233832"/>
+                  <a:pt x="0" y="0"/>
+                </a:cubicBezTo>
+                <a:close/>
+              </a:path>
+              <a:path w="645275" h="1006252" stroke="0" extrusionOk="0">
+                <a:moveTo>
+                  <a:pt x="0" y="0"/>
+                </a:moveTo>
+                <a:cubicBezTo>
+                  <a:pt x="154586" y="-27363"/>
+                  <a:pt x="355413" y="-6638"/>
+                  <a:pt x="645275" y="0"/>
+                </a:cubicBezTo>
+                <a:cubicBezTo>
+                  <a:pt x="634526" y="164704"/>
+                  <a:pt x="622576" y="269089"/>
+                  <a:pt x="645275" y="513189"/>
+                </a:cubicBezTo>
+                <a:cubicBezTo>
+                  <a:pt x="667974" y="757289"/>
+                  <a:pt x="623069" y="894650"/>
+                  <a:pt x="645275" y="1006252"/>
+                </a:cubicBezTo>
+                <a:cubicBezTo>
+                  <a:pt x="434048" y="992178"/>
+                  <a:pt x="227479" y="1021620"/>
+                  <a:pt x="0" y="1006252"/>
+                </a:cubicBezTo>
+                <a:cubicBezTo>
+                  <a:pt x="18951" y="844652"/>
+                  <a:pt x="-17934" y="634301"/>
+                  <a:pt x="0" y="493063"/>
+                </a:cubicBezTo>
+                <a:cubicBezTo>
+                  <a:pt x="17934" y="351825"/>
+                  <a:pt x="-9286" y="170608"/>
+                  <a:pt x="0" y="0"/>
+                </a:cubicBezTo>
+                <a:close/>
+              </a:path>
+            </a:pathLst>
+          </a:custGeom>
+          <a:ln>
+            <a:solidFill>
+              <a:srgbClr val="176E81"/>
+            </a:solidFill>
+            <a:extLst>
+              <a:ext uri="{C807C97D-BFC1-408E-A445-0C87EB9F89A2}">
+                <ask:lineSketchStyleProps xmlns:ask="http://schemas.microsoft.com/office/drawing/2018/sketchyshapes" sd="4005209245">
+                  <a:prstGeom prst="rect">
+                    <a:avLst/>
+                  </a:prstGeom>
+                  <ask:type>
+                    <ask:lineSketchFreehand/>
+                  </ask:type>
+                </ask:lineSketchStyleProps>
+              </a:ext>
+            </a:extLst>
+          </a:ln>
+          <a:effectLst>
+            <a:outerShdw blurRad="292100" dist="139700" dir="2700000" algn="tl" rotWithShape="0">
+              <a:srgbClr val="333333">
+                <a:alpha val="65000"/>
+              </a:srgbClr>
+            </a:outerShdw>
+          </a:effectLst>
+        </p:spPr>
+      </p:pic>
+      <p:sp>
+        <p:nvSpPr>
+          <p:cNvPr id="5" name="Oval 4">
+            <a:extLst>
+              <a:ext uri="{FF2B5EF4-FFF2-40B4-BE49-F238E27FC236}">
+                <a16:creationId xmlns:a16="http://schemas.microsoft.com/office/drawing/2014/main" id="{B49EB171-00D7-D3A7-A26A-B6DCEA327EA9}"/>
+              </a:ext>
+            </a:extLst>
+          </p:cNvPr>
           <p:cNvSpPr/>
           <p:nvPr/>
         </p:nvSpPr>
         <p:spPr>
           <a:xfrm>
-            <a:off x="6280190" y="3045976"/>
-            <a:ext cx="5670590" cy="708779"/>
+            <a:off x="4298234" y="1449456"/>
+            <a:ext cx="1838739" cy="1878496"/>
+          </a:xfrm>
+          <a:custGeom>
+            <a:avLst/>
+            <a:gdLst>
+              <a:gd name="connsiteX0" fmla="*/ 0 w 1838739"/>
+              <a:gd name="connsiteY0" fmla="*/ 939248 h 1878496"/>
+              <a:gd name="connsiteX1" fmla="*/ 919370 w 1838739"/>
+              <a:gd name="connsiteY1" fmla="*/ 0 h 1878496"/>
+              <a:gd name="connsiteX2" fmla="*/ 1838740 w 1838739"/>
+              <a:gd name="connsiteY2" fmla="*/ 939248 h 1878496"/>
+              <a:gd name="connsiteX3" fmla="*/ 919370 w 1838739"/>
+              <a:gd name="connsiteY3" fmla="*/ 1878496 h 1878496"/>
+              <a:gd name="connsiteX4" fmla="*/ 0 w 1838739"/>
+              <a:gd name="connsiteY4" fmla="*/ 939248 h 1878496"/>
+            </a:gdLst>
+            <a:ahLst/>
+            <a:cxnLst>
+              <a:cxn ang="0">
+                <a:pos x="connsiteX0" y="connsiteY0"/>
+              </a:cxn>
+              <a:cxn ang="0">
+                <a:pos x="connsiteX1" y="connsiteY1"/>
+              </a:cxn>
+              <a:cxn ang="0">
+                <a:pos x="connsiteX2" y="connsiteY2"/>
+              </a:cxn>
+              <a:cxn ang="0">
+                <a:pos x="connsiteX3" y="connsiteY3"/>
+              </a:cxn>
+              <a:cxn ang="0">
+                <a:pos x="connsiteX4" y="connsiteY4"/>
+              </a:cxn>
+            </a:cxnLst>
+            <a:rect l="l" t="t" r="r" b="b"/>
+            <a:pathLst>
+              <a:path w="1838739" h="1878496" fill="none" extrusionOk="0">
+                <a:moveTo>
+                  <a:pt x="0" y="939248"/>
+                </a:moveTo>
+                <a:cubicBezTo>
+                  <a:pt x="8516" y="444851"/>
+                  <a:pt x="486212" y="-102644"/>
+                  <a:pt x="919370" y="0"/>
+                </a:cubicBezTo>
+                <a:cubicBezTo>
+                  <a:pt x="1369131" y="-33013"/>
+                  <a:pt x="1909979" y="339152"/>
+                  <a:pt x="1838740" y="939248"/>
+                </a:cubicBezTo>
+                <a:cubicBezTo>
+                  <a:pt x="1784503" y="1467928"/>
+                  <a:pt x="1335673" y="1845098"/>
+                  <a:pt x="919370" y="1878496"/>
+                </a:cubicBezTo>
+                <a:cubicBezTo>
+                  <a:pt x="352884" y="1969963"/>
+                  <a:pt x="-24061" y="1460038"/>
+                  <a:pt x="0" y="939248"/>
+                </a:cubicBezTo>
+                <a:close/>
+              </a:path>
+              <a:path w="1838739" h="1878496" stroke="0" extrusionOk="0">
+                <a:moveTo>
+                  <a:pt x="0" y="939248"/>
+                </a:moveTo>
+                <a:cubicBezTo>
+                  <a:pt x="17302" y="424657"/>
+                  <a:pt x="414715" y="-105267"/>
+                  <a:pt x="919370" y="0"/>
+                </a:cubicBezTo>
+                <a:cubicBezTo>
+                  <a:pt x="1443049" y="6157"/>
+                  <a:pt x="1753072" y="396298"/>
+                  <a:pt x="1838740" y="939248"/>
+                </a:cubicBezTo>
+                <a:cubicBezTo>
+                  <a:pt x="1762976" y="1414053"/>
+                  <a:pt x="1494882" y="1823617"/>
+                  <a:pt x="919370" y="1878496"/>
+                </a:cubicBezTo>
+                <a:cubicBezTo>
+                  <a:pt x="489928" y="1893050"/>
+                  <a:pt x="114966" y="1494157"/>
+                  <a:pt x="0" y="939248"/>
+                </a:cubicBezTo>
+                <a:close/>
+              </a:path>
+            </a:pathLst>
+          </a:custGeom>
+          <a:solidFill>
+            <a:srgbClr val="176E81"/>
+          </a:solidFill>
+          <a:ln>
+            <a:solidFill>
+              <a:srgbClr val="F7E9CF"/>
+            </a:solidFill>
+            <a:extLst>
+              <a:ext uri="{C807C97D-BFC1-408E-A445-0C87EB9F89A2}">
+                <ask:lineSketchStyleProps xmlns:ask="http://schemas.microsoft.com/office/drawing/2018/sketchyshapes" sd="1972766936">
+                  <a:prstGeom prst="ellipse">
+                    <a:avLst/>
+                  </a:prstGeom>
+                  <ask:type>
+                    <ask:lineSketchFreehand/>
+                  </ask:type>
+                </ask:lineSketchStyleProps>
+              </a:ext>
+            </a:extLst>
+          </a:ln>
+        </p:spPr>
+        <p:style>
+          <a:lnRef idx="2">
+            <a:schemeClr val="accent1">
+              <a:shade val="15000"/>
+            </a:schemeClr>
+          </a:lnRef>
+          <a:fillRef idx="1">
+            <a:schemeClr val="accent1"/>
+          </a:fillRef>
+          <a:effectRef idx="0">
+            <a:schemeClr val="accent1"/>
+          </a:effectRef>
+          <a:fontRef idx="minor">
+            <a:schemeClr val="lt1"/>
+          </a:fontRef>
+        </p:style>
+        <p:txBody>
+          <a:bodyPr rtlCol="0" anchor="ctr"/>
+          <a:lstStyle/>
+          <a:p>
+            <a:pPr algn="ctr"/>
+            <a:endParaRPr lang="en-IL"/>
+          </a:p>
+        </p:txBody>
+      </p:sp>
+      <p:sp>
+        <p:nvSpPr>
+          <p:cNvPr id="6" name="Oval 5">
+            <a:extLst>
+              <a:ext uri="{FF2B5EF4-FFF2-40B4-BE49-F238E27FC236}">
+                <a16:creationId xmlns:a16="http://schemas.microsoft.com/office/drawing/2014/main" id="{91AC439F-4B8F-86BD-A7A7-0FB97F3B7E4F}"/>
+              </a:ext>
+            </a:extLst>
+          </p:cNvPr>
+          <p:cNvSpPr/>
+          <p:nvPr/>
+        </p:nvSpPr>
+        <p:spPr>
+          <a:xfrm>
+            <a:off x="12761844" y="6291470"/>
+            <a:ext cx="1838739" cy="1586948"/>
+          </a:xfrm>
+          <a:custGeom>
+            <a:avLst/>
+            <a:gdLst>
+              <a:gd name="connsiteX0" fmla="*/ 0 w 1838739"/>
+              <a:gd name="connsiteY0" fmla="*/ 793474 h 1586948"/>
+              <a:gd name="connsiteX1" fmla="*/ 919370 w 1838739"/>
+              <a:gd name="connsiteY1" fmla="*/ 0 h 1586948"/>
+              <a:gd name="connsiteX2" fmla="*/ 1838740 w 1838739"/>
+              <a:gd name="connsiteY2" fmla="*/ 793474 h 1586948"/>
+              <a:gd name="connsiteX3" fmla="*/ 919370 w 1838739"/>
+              <a:gd name="connsiteY3" fmla="*/ 1586948 h 1586948"/>
+              <a:gd name="connsiteX4" fmla="*/ 0 w 1838739"/>
+              <a:gd name="connsiteY4" fmla="*/ 793474 h 1586948"/>
+            </a:gdLst>
+            <a:ahLst/>
+            <a:cxnLst>
+              <a:cxn ang="0">
+                <a:pos x="connsiteX0" y="connsiteY0"/>
+              </a:cxn>
+              <a:cxn ang="0">
+                <a:pos x="connsiteX1" y="connsiteY1"/>
+              </a:cxn>
+              <a:cxn ang="0">
+                <a:pos x="connsiteX2" y="connsiteY2"/>
+              </a:cxn>
+              <a:cxn ang="0">
+                <a:pos x="connsiteX3" y="connsiteY3"/>
+              </a:cxn>
+              <a:cxn ang="0">
+                <a:pos x="connsiteX4" y="connsiteY4"/>
+              </a:cxn>
+            </a:cxnLst>
+            <a:rect l="l" t="t" r="r" b="b"/>
+            <a:pathLst>
+              <a:path w="1838739" h="1586948" fill="none" extrusionOk="0">
+                <a:moveTo>
+                  <a:pt x="0" y="793474"/>
+                </a:moveTo>
+                <a:cubicBezTo>
+                  <a:pt x="44917" y="253554"/>
+                  <a:pt x="490282" y="95205"/>
+                  <a:pt x="919370" y="0"/>
+                </a:cubicBezTo>
+                <a:cubicBezTo>
+                  <a:pt x="1490165" y="78188"/>
+                  <a:pt x="1746009" y="374766"/>
+                  <a:pt x="1838740" y="793474"/>
+                </a:cubicBezTo>
+                <a:cubicBezTo>
+                  <a:pt x="1828538" y="1193311"/>
+                  <a:pt x="1405046" y="1622247"/>
+                  <a:pt x="919370" y="1586948"/>
+                </a:cubicBezTo>
+                <a:cubicBezTo>
+                  <a:pt x="407035" y="1569963"/>
+                  <a:pt x="55026" y="1182415"/>
+                  <a:pt x="0" y="793474"/>
+                </a:cubicBezTo>
+                <a:close/>
+              </a:path>
+              <a:path w="1838739" h="1586948" stroke="0" extrusionOk="0">
+                <a:moveTo>
+                  <a:pt x="0" y="793474"/>
+                </a:moveTo>
+                <a:cubicBezTo>
+                  <a:pt x="-107981" y="379722"/>
+                  <a:pt x="318833" y="26585"/>
+                  <a:pt x="919370" y="0"/>
+                </a:cubicBezTo>
+                <a:cubicBezTo>
+                  <a:pt x="1424761" y="-34412"/>
+                  <a:pt x="1810557" y="299912"/>
+                  <a:pt x="1838740" y="793474"/>
+                </a:cubicBezTo>
+                <a:cubicBezTo>
+                  <a:pt x="1817067" y="1230281"/>
+                  <a:pt x="1443492" y="1485366"/>
+                  <a:pt x="919370" y="1586948"/>
+                </a:cubicBezTo>
+                <a:cubicBezTo>
+                  <a:pt x="401914" y="1579116"/>
+                  <a:pt x="-89621" y="1209984"/>
+                  <a:pt x="0" y="793474"/>
+                </a:cubicBezTo>
+                <a:close/>
+              </a:path>
+            </a:pathLst>
+          </a:custGeom>
+          <a:solidFill>
+            <a:srgbClr val="176E81"/>
+          </a:solidFill>
+          <a:ln>
+            <a:solidFill>
+              <a:srgbClr val="F7E9CF"/>
+            </a:solidFill>
+            <a:extLst>
+              <a:ext uri="{C807C97D-BFC1-408E-A445-0C87EB9F89A2}">
+                <ask:lineSketchStyleProps xmlns:ask="http://schemas.microsoft.com/office/drawing/2018/sketchyshapes" sd="2987898698">
+                  <a:prstGeom prst="ellipse">
+                    <a:avLst/>
+                  </a:prstGeom>
+                  <ask:type>
+                    <ask:lineSketchFreehand/>
+                  </ask:type>
+                </ask:lineSketchStyleProps>
+              </a:ext>
+            </a:extLst>
+          </a:ln>
+        </p:spPr>
+        <p:style>
+          <a:lnRef idx="2">
+            <a:schemeClr val="accent1">
+              <a:shade val="15000"/>
+            </a:schemeClr>
+          </a:lnRef>
+          <a:fillRef idx="1">
+            <a:schemeClr val="accent1"/>
+          </a:fillRef>
+          <a:effectRef idx="0">
+            <a:schemeClr val="accent1"/>
+          </a:effectRef>
+          <a:fontRef idx="minor">
+            <a:schemeClr val="lt1"/>
+          </a:fontRef>
+        </p:style>
+        <p:txBody>
+          <a:bodyPr rtlCol="0" anchor="ctr"/>
+          <a:lstStyle/>
+          <a:p>
+            <a:pPr algn="ctr"/>
+            <a:endParaRPr lang="en-IL"/>
+          </a:p>
+        </p:txBody>
+      </p:sp>
+      <p:sp>
+        <p:nvSpPr>
+          <p:cNvPr id="7" name="Oval 6">
+            <a:extLst>
+              <a:ext uri="{FF2B5EF4-FFF2-40B4-BE49-F238E27FC236}">
+                <a16:creationId xmlns:a16="http://schemas.microsoft.com/office/drawing/2014/main" id="{92177D76-5A75-F251-0229-0A989863397F}"/>
+              </a:ext>
+            </a:extLst>
+          </p:cNvPr>
+          <p:cNvSpPr/>
+          <p:nvPr/>
+        </p:nvSpPr>
+        <p:spPr>
+          <a:xfrm>
+            <a:off x="8728803" y="5352222"/>
+            <a:ext cx="1583635" cy="1878496"/>
+          </a:xfrm>
+          <a:custGeom>
+            <a:avLst/>
+            <a:gdLst>
+              <a:gd name="connsiteX0" fmla="*/ 0 w 1583635"/>
+              <a:gd name="connsiteY0" fmla="*/ 939248 h 1878496"/>
+              <a:gd name="connsiteX1" fmla="*/ 791818 w 1583635"/>
+              <a:gd name="connsiteY1" fmla="*/ 0 h 1878496"/>
+              <a:gd name="connsiteX2" fmla="*/ 1583636 w 1583635"/>
+              <a:gd name="connsiteY2" fmla="*/ 939248 h 1878496"/>
+              <a:gd name="connsiteX3" fmla="*/ 791818 w 1583635"/>
+              <a:gd name="connsiteY3" fmla="*/ 1878496 h 1878496"/>
+              <a:gd name="connsiteX4" fmla="*/ 0 w 1583635"/>
+              <a:gd name="connsiteY4" fmla="*/ 939248 h 1878496"/>
+            </a:gdLst>
+            <a:ahLst/>
+            <a:cxnLst>
+              <a:cxn ang="0">
+                <a:pos x="connsiteX0" y="connsiteY0"/>
+              </a:cxn>
+              <a:cxn ang="0">
+                <a:pos x="connsiteX1" y="connsiteY1"/>
+              </a:cxn>
+              <a:cxn ang="0">
+                <a:pos x="connsiteX2" y="connsiteY2"/>
+              </a:cxn>
+              <a:cxn ang="0">
+                <a:pos x="connsiteX3" y="connsiteY3"/>
+              </a:cxn>
+              <a:cxn ang="0">
+                <a:pos x="connsiteX4" y="connsiteY4"/>
+              </a:cxn>
+            </a:cxnLst>
+            <a:rect l="l" t="t" r="r" b="b"/>
+            <a:pathLst>
+              <a:path w="1583635" h="1878496" fill="none" extrusionOk="0">
+                <a:moveTo>
+                  <a:pt x="0" y="939248"/>
+                </a:moveTo>
+                <a:cubicBezTo>
+                  <a:pt x="65353" y="429210"/>
+                  <a:pt x="410963" y="-69190"/>
+                  <a:pt x="791818" y="0"/>
+                </a:cubicBezTo>
+                <a:cubicBezTo>
+                  <a:pt x="1307706" y="-61977"/>
+                  <a:pt x="1491529" y="360579"/>
+                  <a:pt x="1583636" y="939248"/>
+                </a:cubicBezTo>
+                <a:cubicBezTo>
+                  <a:pt x="1598450" y="1438876"/>
+                  <a:pt x="1272536" y="1837073"/>
+                  <a:pt x="791818" y="1878496"/>
+                </a:cubicBezTo>
+                <a:cubicBezTo>
+                  <a:pt x="354266" y="1901428"/>
+                  <a:pt x="-30113" y="1438667"/>
+                  <a:pt x="0" y="939248"/>
+                </a:cubicBezTo>
+                <a:close/>
+              </a:path>
+              <a:path w="1583635" h="1878496" stroke="0" extrusionOk="0">
+                <a:moveTo>
+                  <a:pt x="0" y="939248"/>
+                </a:moveTo>
+                <a:cubicBezTo>
+                  <a:pt x="-36282" y="491663"/>
+                  <a:pt x="350587" y="-66308"/>
+                  <a:pt x="791818" y="0"/>
+                </a:cubicBezTo>
+                <a:cubicBezTo>
+                  <a:pt x="1335824" y="-24522"/>
+                  <a:pt x="1460665" y="380557"/>
+                  <a:pt x="1583636" y="939248"/>
+                </a:cubicBezTo>
+                <a:cubicBezTo>
+                  <a:pt x="1501019" y="1387620"/>
+                  <a:pt x="1227503" y="1924688"/>
+                  <a:pt x="791818" y="1878496"/>
+                </a:cubicBezTo>
+                <a:cubicBezTo>
+                  <a:pt x="337646" y="1901307"/>
+                  <a:pt x="-88712" y="1474713"/>
+                  <a:pt x="0" y="939248"/>
+                </a:cubicBezTo>
+                <a:close/>
+              </a:path>
+            </a:pathLst>
+          </a:custGeom>
+          <a:solidFill>
+            <a:srgbClr val="176E81"/>
+          </a:solidFill>
+          <a:ln>
+            <a:solidFill>
+              <a:srgbClr val="F7E9CF"/>
+            </a:solidFill>
+            <a:extLst>
+              <a:ext uri="{C807C97D-BFC1-408E-A445-0C87EB9F89A2}">
+                <ask:lineSketchStyleProps xmlns:ask="http://schemas.microsoft.com/office/drawing/2018/sketchyshapes" sd="1561943965">
+                  <a:prstGeom prst="ellipse">
+                    <a:avLst/>
+                  </a:prstGeom>
+                  <ask:type>
+                    <ask:lineSketchFreehand/>
+                  </ask:type>
+                </ask:lineSketchStyleProps>
+              </a:ext>
+            </a:extLst>
+          </a:ln>
+        </p:spPr>
+        <p:style>
+          <a:lnRef idx="2">
+            <a:schemeClr val="accent1">
+              <a:shade val="15000"/>
+            </a:schemeClr>
+          </a:lnRef>
+          <a:fillRef idx="1">
+            <a:schemeClr val="accent1"/>
+          </a:fillRef>
+          <a:effectRef idx="0">
+            <a:schemeClr val="accent1"/>
+          </a:effectRef>
+          <a:fontRef idx="minor">
+            <a:schemeClr val="lt1"/>
+          </a:fontRef>
+        </p:style>
+        <p:txBody>
+          <a:bodyPr rtlCol="0" anchor="ctr"/>
+          <a:lstStyle/>
+          <a:p>
+            <a:pPr algn="ctr"/>
+            <a:endParaRPr lang="en-IL"/>
+          </a:p>
+        </p:txBody>
+      </p:sp>
+      <p:sp>
+        <p:nvSpPr>
+          <p:cNvPr id="8" name="Oval 7">
+            <a:extLst>
+              <a:ext uri="{FF2B5EF4-FFF2-40B4-BE49-F238E27FC236}">
+                <a16:creationId xmlns:a16="http://schemas.microsoft.com/office/drawing/2014/main" id="{EB08CFD8-8B28-96B3-5FE0-30AF77926646}"/>
+              </a:ext>
+            </a:extLst>
+          </p:cNvPr>
+          <p:cNvSpPr/>
+          <p:nvPr/>
+        </p:nvSpPr>
+        <p:spPr>
+          <a:xfrm>
+            <a:off x="11956774" y="2295938"/>
+            <a:ext cx="1838739" cy="1514061"/>
+          </a:xfrm>
+          <a:custGeom>
+            <a:avLst/>
+            <a:gdLst>
+              <a:gd name="connsiteX0" fmla="*/ 0 w 1838739"/>
+              <a:gd name="connsiteY0" fmla="*/ 757031 h 1514061"/>
+              <a:gd name="connsiteX1" fmla="*/ 919370 w 1838739"/>
+              <a:gd name="connsiteY1" fmla="*/ 0 h 1514061"/>
+              <a:gd name="connsiteX2" fmla="*/ 1838740 w 1838739"/>
+              <a:gd name="connsiteY2" fmla="*/ 757031 h 1514061"/>
+              <a:gd name="connsiteX3" fmla="*/ 919370 w 1838739"/>
+              <a:gd name="connsiteY3" fmla="*/ 1514062 h 1514061"/>
+              <a:gd name="connsiteX4" fmla="*/ 0 w 1838739"/>
+              <a:gd name="connsiteY4" fmla="*/ 757031 h 1514061"/>
+            </a:gdLst>
+            <a:ahLst/>
+            <a:cxnLst>
+              <a:cxn ang="0">
+                <a:pos x="connsiteX0" y="connsiteY0"/>
+              </a:cxn>
+              <a:cxn ang="0">
+                <a:pos x="connsiteX1" y="connsiteY1"/>
+              </a:cxn>
+              <a:cxn ang="0">
+                <a:pos x="connsiteX2" y="connsiteY2"/>
+              </a:cxn>
+              <a:cxn ang="0">
+                <a:pos x="connsiteX3" y="connsiteY3"/>
+              </a:cxn>
+              <a:cxn ang="0">
+                <a:pos x="connsiteX4" y="connsiteY4"/>
+              </a:cxn>
+            </a:cxnLst>
+            <a:rect l="l" t="t" r="r" b="b"/>
+            <a:pathLst>
+              <a:path w="1838739" h="1514061" fill="none" extrusionOk="0">
+                <a:moveTo>
+                  <a:pt x="0" y="757031"/>
+                </a:moveTo>
+                <a:cubicBezTo>
+                  <a:pt x="-67156" y="356481"/>
+                  <a:pt x="485670" y="9578"/>
+                  <a:pt x="919370" y="0"/>
+                </a:cubicBezTo>
+                <a:cubicBezTo>
+                  <a:pt x="1382131" y="-60848"/>
+                  <a:pt x="1815294" y="342312"/>
+                  <a:pt x="1838740" y="757031"/>
+                </a:cubicBezTo>
+                <a:cubicBezTo>
+                  <a:pt x="1940601" y="1107123"/>
+                  <a:pt x="1375099" y="1462591"/>
+                  <a:pt x="919370" y="1514062"/>
+                </a:cubicBezTo>
+                <a:cubicBezTo>
+                  <a:pt x="440806" y="1592310"/>
+                  <a:pt x="9198" y="1166346"/>
+                  <a:pt x="0" y="757031"/>
+                </a:cubicBezTo>
+                <a:close/>
+              </a:path>
+              <a:path w="1838739" h="1514061" stroke="0" extrusionOk="0">
+                <a:moveTo>
+                  <a:pt x="0" y="757031"/>
+                </a:moveTo>
+                <a:cubicBezTo>
+                  <a:pt x="10939" y="262350"/>
+                  <a:pt x="422322" y="5718"/>
+                  <a:pt x="919370" y="0"/>
+                </a:cubicBezTo>
+                <a:cubicBezTo>
+                  <a:pt x="1421422" y="51834"/>
+                  <a:pt x="1786519" y="248921"/>
+                  <a:pt x="1838740" y="757031"/>
+                </a:cubicBezTo>
+                <a:cubicBezTo>
+                  <a:pt x="1918372" y="1198408"/>
+                  <a:pt x="1441957" y="1478180"/>
+                  <a:pt x="919370" y="1514062"/>
+                </a:cubicBezTo>
+                <a:cubicBezTo>
+                  <a:pt x="437228" y="1496504"/>
+                  <a:pt x="3939" y="1217330"/>
+                  <a:pt x="0" y="757031"/>
+                </a:cubicBezTo>
+                <a:close/>
+              </a:path>
+            </a:pathLst>
+          </a:custGeom>
+          <a:solidFill>
+            <a:srgbClr val="176E81"/>
+          </a:solidFill>
+          <a:ln>
+            <a:solidFill>
+              <a:srgbClr val="F7E9CF"/>
+            </a:solidFill>
+            <a:extLst>
+              <a:ext uri="{C807C97D-BFC1-408E-A445-0C87EB9F89A2}">
+                <ask:lineSketchStyleProps xmlns:ask="http://schemas.microsoft.com/office/drawing/2018/sketchyshapes" sd="1238195396">
+                  <a:prstGeom prst="ellipse">
+                    <a:avLst/>
+                  </a:prstGeom>
+                  <ask:type>
+                    <ask:lineSketchFreehand/>
+                  </ask:type>
+                </ask:lineSketchStyleProps>
+              </a:ext>
+            </a:extLst>
+          </a:ln>
+        </p:spPr>
+        <p:style>
+          <a:lnRef idx="2">
+            <a:schemeClr val="accent1">
+              <a:shade val="15000"/>
+            </a:schemeClr>
+          </a:lnRef>
+          <a:fillRef idx="1">
+            <a:schemeClr val="accent1"/>
+          </a:fillRef>
+          <a:effectRef idx="0">
+            <a:schemeClr val="accent1"/>
+          </a:effectRef>
+          <a:fontRef idx="minor">
+            <a:schemeClr val="lt1"/>
+          </a:fontRef>
+        </p:style>
+        <p:txBody>
+          <a:bodyPr rtlCol="0" anchor="ctr"/>
+          <a:lstStyle/>
+          <a:p>
+            <a:pPr algn="ctr"/>
+            <a:endParaRPr lang="en-IL"/>
+          </a:p>
+        </p:txBody>
+      </p:sp>
+      <p:sp>
+        <p:nvSpPr>
+          <p:cNvPr id="9" name="Oval 8">
+            <a:extLst>
+              <a:ext uri="{FF2B5EF4-FFF2-40B4-BE49-F238E27FC236}">
+                <a16:creationId xmlns:a16="http://schemas.microsoft.com/office/drawing/2014/main" id="{3C80FF58-958D-5E09-4210-95537175D272}"/>
+              </a:ext>
+            </a:extLst>
+          </p:cNvPr>
+          <p:cNvSpPr/>
+          <p:nvPr/>
+        </p:nvSpPr>
+        <p:spPr>
+          <a:xfrm>
+            <a:off x="1048583" y="510208"/>
+            <a:ext cx="1838739" cy="1878496"/>
+          </a:xfrm>
+          <a:custGeom>
+            <a:avLst/>
+            <a:gdLst>
+              <a:gd name="connsiteX0" fmla="*/ 0 w 1838739"/>
+              <a:gd name="connsiteY0" fmla="*/ 939248 h 1878496"/>
+              <a:gd name="connsiteX1" fmla="*/ 919370 w 1838739"/>
+              <a:gd name="connsiteY1" fmla="*/ 0 h 1878496"/>
+              <a:gd name="connsiteX2" fmla="*/ 1838740 w 1838739"/>
+              <a:gd name="connsiteY2" fmla="*/ 939248 h 1878496"/>
+              <a:gd name="connsiteX3" fmla="*/ 919370 w 1838739"/>
+              <a:gd name="connsiteY3" fmla="*/ 1878496 h 1878496"/>
+              <a:gd name="connsiteX4" fmla="*/ 0 w 1838739"/>
+              <a:gd name="connsiteY4" fmla="*/ 939248 h 1878496"/>
+            </a:gdLst>
+            <a:ahLst/>
+            <a:cxnLst>
+              <a:cxn ang="0">
+                <a:pos x="connsiteX0" y="connsiteY0"/>
+              </a:cxn>
+              <a:cxn ang="0">
+                <a:pos x="connsiteX1" y="connsiteY1"/>
+              </a:cxn>
+              <a:cxn ang="0">
+                <a:pos x="connsiteX2" y="connsiteY2"/>
+              </a:cxn>
+              <a:cxn ang="0">
+                <a:pos x="connsiteX3" y="connsiteY3"/>
+              </a:cxn>
+              <a:cxn ang="0">
+                <a:pos x="connsiteX4" y="connsiteY4"/>
+              </a:cxn>
+            </a:cxnLst>
+            <a:rect l="l" t="t" r="r" b="b"/>
+            <a:pathLst>
+              <a:path w="1838739" h="1878496" fill="none" extrusionOk="0">
+                <a:moveTo>
+                  <a:pt x="0" y="939248"/>
+                </a:moveTo>
+                <a:cubicBezTo>
+                  <a:pt x="107213" y="468917"/>
+                  <a:pt x="386439" y="-37562"/>
+                  <a:pt x="919370" y="0"/>
+                </a:cubicBezTo>
+                <a:cubicBezTo>
+                  <a:pt x="1465099" y="109180"/>
+                  <a:pt x="1800679" y="405430"/>
+                  <a:pt x="1838740" y="939248"/>
+                </a:cubicBezTo>
+                <a:cubicBezTo>
+                  <a:pt x="1890448" y="1433231"/>
+                  <a:pt x="1445789" y="1905604"/>
+                  <a:pt x="919370" y="1878496"/>
+                </a:cubicBezTo>
+                <a:cubicBezTo>
+                  <a:pt x="419911" y="1847039"/>
+                  <a:pt x="9360" y="1380519"/>
+                  <a:pt x="0" y="939248"/>
+                </a:cubicBezTo>
+                <a:close/>
+              </a:path>
+              <a:path w="1838739" h="1878496" stroke="0" extrusionOk="0">
+                <a:moveTo>
+                  <a:pt x="0" y="939248"/>
+                </a:moveTo>
+                <a:cubicBezTo>
+                  <a:pt x="29476" y="400700"/>
+                  <a:pt x="307789" y="11129"/>
+                  <a:pt x="919370" y="0"/>
+                </a:cubicBezTo>
+                <a:cubicBezTo>
+                  <a:pt x="1449777" y="-40809"/>
+                  <a:pt x="1797113" y="526737"/>
+                  <a:pt x="1838740" y="939248"/>
+                </a:cubicBezTo>
+                <a:cubicBezTo>
+                  <a:pt x="1786914" y="1506824"/>
+                  <a:pt x="1380084" y="1891521"/>
+                  <a:pt x="919370" y="1878496"/>
+                </a:cubicBezTo>
+                <a:cubicBezTo>
+                  <a:pt x="414631" y="1843736"/>
+                  <a:pt x="-45081" y="1497794"/>
+                  <a:pt x="0" y="939248"/>
+                </a:cubicBezTo>
+                <a:close/>
+              </a:path>
+            </a:pathLst>
+          </a:custGeom>
+          <a:solidFill>
+            <a:srgbClr val="176E81"/>
+          </a:solidFill>
+          <a:ln>
+            <a:solidFill>
+              <a:srgbClr val="F7E9CF"/>
+            </a:solidFill>
+            <a:extLst>
+              <a:ext uri="{C807C97D-BFC1-408E-A445-0C87EB9F89A2}">
+                <ask:lineSketchStyleProps xmlns:ask="http://schemas.microsoft.com/office/drawing/2018/sketchyshapes" sd="1935646484">
+                  <a:prstGeom prst="ellipse">
+                    <a:avLst/>
+                  </a:prstGeom>
+                  <ask:type>
+                    <ask:lineSketchFreehand/>
+                  </ask:type>
+                </ask:lineSketchStyleProps>
+              </a:ext>
+            </a:extLst>
+          </a:ln>
+        </p:spPr>
+        <p:style>
+          <a:lnRef idx="2">
+            <a:schemeClr val="accent1">
+              <a:shade val="15000"/>
+            </a:schemeClr>
+          </a:lnRef>
+          <a:fillRef idx="1">
+            <a:schemeClr val="accent1"/>
+          </a:fillRef>
+          <a:effectRef idx="0">
+            <a:schemeClr val="accent1"/>
+          </a:effectRef>
+          <a:fontRef idx="minor">
+            <a:schemeClr val="lt1"/>
+          </a:fontRef>
+        </p:style>
+        <p:txBody>
+          <a:bodyPr rtlCol="0" anchor="ctr"/>
+          <a:lstStyle/>
+          <a:p>
+            <a:pPr algn="ctr"/>
+            <a:endParaRPr lang="en-IL"/>
+          </a:p>
+        </p:txBody>
+      </p:sp>
+      <p:sp>
+        <p:nvSpPr>
+          <p:cNvPr id="10" name="Oval 9">
+            <a:extLst>
+              <a:ext uri="{FF2B5EF4-FFF2-40B4-BE49-F238E27FC236}">
+                <a16:creationId xmlns:a16="http://schemas.microsoft.com/office/drawing/2014/main" id="{DF3C4003-0BCE-456B-6BD7-15EF87517899}"/>
+              </a:ext>
+            </a:extLst>
+          </p:cNvPr>
+          <p:cNvSpPr/>
+          <p:nvPr/>
+        </p:nvSpPr>
+        <p:spPr>
+          <a:xfrm>
+            <a:off x="712304" y="6139069"/>
+            <a:ext cx="2557670" cy="1878496"/>
+          </a:xfrm>
+          <a:custGeom>
+            <a:avLst/>
+            <a:gdLst>
+              <a:gd name="connsiteX0" fmla="*/ 0 w 2557670"/>
+              <a:gd name="connsiteY0" fmla="*/ 939248 h 1878496"/>
+              <a:gd name="connsiteX1" fmla="*/ 1278835 w 2557670"/>
+              <a:gd name="connsiteY1" fmla="*/ 0 h 1878496"/>
+              <a:gd name="connsiteX2" fmla="*/ 2557670 w 2557670"/>
+              <a:gd name="connsiteY2" fmla="*/ 939248 h 1878496"/>
+              <a:gd name="connsiteX3" fmla="*/ 1278835 w 2557670"/>
+              <a:gd name="connsiteY3" fmla="*/ 1878496 h 1878496"/>
+              <a:gd name="connsiteX4" fmla="*/ 0 w 2557670"/>
+              <a:gd name="connsiteY4" fmla="*/ 939248 h 1878496"/>
+            </a:gdLst>
+            <a:ahLst/>
+            <a:cxnLst>
+              <a:cxn ang="0">
+                <a:pos x="connsiteX0" y="connsiteY0"/>
+              </a:cxn>
+              <a:cxn ang="0">
+                <a:pos x="connsiteX1" y="connsiteY1"/>
+              </a:cxn>
+              <a:cxn ang="0">
+                <a:pos x="connsiteX2" y="connsiteY2"/>
+              </a:cxn>
+              <a:cxn ang="0">
+                <a:pos x="connsiteX3" y="connsiteY3"/>
+              </a:cxn>
+              <a:cxn ang="0">
+                <a:pos x="connsiteX4" y="connsiteY4"/>
+              </a:cxn>
+            </a:cxnLst>
+            <a:rect l="l" t="t" r="r" b="b"/>
+            <a:pathLst>
+              <a:path w="2557670" h="1878496" fill="none" extrusionOk="0">
+                <a:moveTo>
+                  <a:pt x="0" y="939248"/>
+                </a:moveTo>
+                <a:cubicBezTo>
+                  <a:pt x="-19019" y="472976"/>
+                  <a:pt x="491191" y="54783"/>
+                  <a:pt x="1278835" y="0"/>
+                </a:cubicBezTo>
+                <a:cubicBezTo>
+                  <a:pt x="1990176" y="21907"/>
+                  <a:pt x="2568577" y="312338"/>
+                  <a:pt x="2557670" y="939248"/>
+                </a:cubicBezTo>
+                <a:cubicBezTo>
+                  <a:pt x="2626566" y="1365727"/>
+                  <a:pt x="2108539" y="1879630"/>
+                  <a:pt x="1278835" y="1878496"/>
+                </a:cubicBezTo>
+                <a:cubicBezTo>
+                  <a:pt x="583713" y="1926693"/>
+                  <a:pt x="24595" y="1425644"/>
+                  <a:pt x="0" y="939248"/>
+                </a:cubicBezTo>
+                <a:close/>
+              </a:path>
+              <a:path w="2557670" h="1878496" stroke="0" extrusionOk="0">
+                <a:moveTo>
+                  <a:pt x="0" y="939248"/>
+                </a:moveTo>
+                <a:cubicBezTo>
+                  <a:pt x="-7295" y="293966"/>
+                  <a:pt x="551813" y="69232"/>
+                  <a:pt x="1278835" y="0"/>
+                </a:cubicBezTo>
+                <a:cubicBezTo>
+                  <a:pt x="1913059" y="-17707"/>
+                  <a:pt x="2545017" y="394286"/>
+                  <a:pt x="2557670" y="939248"/>
+                </a:cubicBezTo>
+                <a:cubicBezTo>
+                  <a:pt x="2603562" y="1444647"/>
+                  <a:pt x="2014943" y="1985224"/>
+                  <a:pt x="1278835" y="1878496"/>
+                </a:cubicBezTo>
+                <a:cubicBezTo>
+                  <a:pt x="538491" y="1943471"/>
+                  <a:pt x="-54890" y="1515272"/>
+                  <a:pt x="0" y="939248"/>
+                </a:cubicBezTo>
+                <a:close/>
+              </a:path>
+            </a:pathLst>
+          </a:custGeom>
+          <a:solidFill>
+            <a:srgbClr val="176E81"/>
+          </a:solidFill>
+          <a:ln>
+            <a:solidFill>
+              <a:srgbClr val="F7E9CF"/>
+            </a:solidFill>
+            <a:extLst>
+              <a:ext uri="{C807C97D-BFC1-408E-A445-0C87EB9F89A2}">
+                <ask:lineSketchStyleProps xmlns:ask="http://schemas.microsoft.com/office/drawing/2018/sketchyshapes" sd="278827545">
+                  <a:prstGeom prst="ellipse">
+                    <a:avLst/>
+                  </a:prstGeom>
+                  <ask:type>
+                    <ask:lineSketchFreehand/>
+                  </ask:type>
+                </ask:lineSketchStyleProps>
+              </a:ext>
+            </a:extLst>
+          </a:ln>
+        </p:spPr>
+        <p:style>
+          <a:lnRef idx="2">
+            <a:schemeClr val="accent1">
+              <a:shade val="15000"/>
+            </a:schemeClr>
+          </a:lnRef>
+          <a:fillRef idx="1">
+            <a:schemeClr val="accent1"/>
+          </a:fillRef>
+          <a:effectRef idx="0">
+            <a:schemeClr val="accent1"/>
+          </a:effectRef>
+          <a:fontRef idx="minor">
+            <a:schemeClr val="lt1"/>
+          </a:fontRef>
+        </p:style>
+        <p:txBody>
+          <a:bodyPr rtlCol="0" anchor="ctr"/>
+          <a:lstStyle/>
+          <a:p>
+            <a:pPr algn="ctr"/>
+            <a:endParaRPr lang="en-IL"/>
+          </a:p>
+        </p:txBody>
+      </p:sp>
+      <p:sp>
+        <p:nvSpPr>
+          <p:cNvPr id="11" name="Oval 10">
+            <a:extLst>
+              <a:ext uri="{FF2B5EF4-FFF2-40B4-BE49-F238E27FC236}">
+                <a16:creationId xmlns:a16="http://schemas.microsoft.com/office/drawing/2014/main" id="{B83AF172-52FD-2AB0-2649-E4E423E9C9BB}"/>
+              </a:ext>
+            </a:extLst>
+          </p:cNvPr>
+          <p:cNvSpPr/>
+          <p:nvPr/>
+        </p:nvSpPr>
+        <p:spPr>
+          <a:xfrm>
+            <a:off x="160681" y="3945835"/>
+            <a:ext cx="1340104" cy="1351722"/>
+          </a:xfrm>
+          <a:custGeom>
+            <a:avLst/>
+            <a:gdLst>
+              <a:gd name="connsiteX0" fmla="*/ 0 w 1340104"/>
+              <a:gd name="connsiteY0" fmla="*/ 675861 h 1351722"/>
+              <a:gd name="connsiteX1" fmla="*/ 670052 w 1340104"/>
+              <a:gd name="connsiteY1" fmla="*/ 0 h 1351722"/>
+              <a:gd name="connsiteX2" fmla="*/ 1340104 w 1340104"/>
+              <a:gd name="connsiteY2" fmla="*/ 675861 h 1351722"/>
+              <a:gd name="connsiteX3" fmla="*/ 670052 w 1340104"/>
+              <a:gd name="connsiteY3" fmla="*/ 1351722 h 1351722"/>
+              <a:gd name="connsiteX4" fmla="*/ 0 w 1340104"/>
+              <a:gd name="connsiteY4" fmla="*/ 675861 h 1351722"/>
+            </a:gdLst>
+            <a:ahLst/>
+            <a:cxnLst>
+              <a:cxn ang="0">
+                <a:pos x="connsiteX0" y="connsiteY0"/>
+              </a:cxn>
+              <a:cxn ang="0">
+                <a:pos x="connsiteX1" y="connsiteY1"/>
+              </a:cxn>
+              <a:cxn ang="0">
+                <a:pos x="connsiteX2" y="connsiteY2"/>
+              </a:cxn>
+              <a:cxn ang="0">
+                <a:pos x="connsiteX3" y="connsiteY3"/>
+              </a:cxn>
+              <a:cxn ang="0">
+                <a:pos x="connsiteX4" y="connsiteY4"/>
+              </a:cxn>
+            </a:cxnLst>
+            <a:rect l="l" t="t" r="r" b="b"/>
+            <a:pathLst>
+              <a:path w="1340104" h="1351722" fill="none" extrusionOk="0">
+                <a:moveTo>
+                  <a:pt x="0" y="675861"/>
+                </a:moveTo>
+                <a:cubicBezTo>
+                  <a:pt x="-26122" y="278236"/>
+                  <a:pt x="286195" y="41676"/>
+                  <a:pt x="670052" y="0"/>
+                </a:cubicBezTo>
+                <a:cubicBezTo>
+                  <a:pt x="1058414" y="-70952"/>
+                  <a:pt x="1299413" y="335387"/>
+                  <a:pt x="1340104" y="675861"/>
+                </a:cubicBezTo>
+                <a:cubicBezTo>
+                  <a:pt x="1297027" y="1004056"/>
+                  <a:pt x="1019703" y="1359267"/>
+                  <a:pt x="670052" y="1351722"/>
+                </a:cubicBezTo>
+                <a:cubicBezTo>
+                  <a:pt x="262621" y="1373434"/>
+                  <a:pt x="-28173" y="976371"/>
+                  <a:pt x="0" y="675861"/>
+                </a:cubicBezTo>
+                <a:close/>
+              </a:path>
+              <a:path w="1340104" h="1351722" stroke="0" extrusionOk="0">
+                <a:moveTo>
+                  <a:pt x="0" y="675861"/>
+                </a:moveTo>
+                <a:cubicBezTo>
+                  <a:pt x="24177" y="254334"/>
+                  <a:pt x="339548" y="-30233"/>
+                  <a:pt x="670052" y="0"/>
+                </a:cubicBezTo>
+                <a:cubicBezTo>
+                  <a:pt x="1016123" y="7230"/>
+                  <a:pt x="1361877" y="290876"/>
+                  <a:pt x="1340104" y="675861"/>
+                </a:cubicBezTo>
+                <a:cubicBezTo>
+                  <a:pt x="1327996" y="1062000"/>
+                  <a:pt x="1011997" y="1346452"/>
+                  <a:pt x="670052" y="1351722"/>
+                </a:cubicBezTo>
+                <a:cubicBezTo>
+                  <a:pt x="275867" y="1400371"/>
+                  <a:pt x="-74002" y="1099619"/>
+                  <a:pt x="0" y="675861"/>
+                </a:cubicBezTo>
+                <a:close/>
+              </a:path>
+            </a:pathLst>
+          </a:custGeom>
+          <a:solidFill>
+            <a:srgbClr val="F7E9CF"/>
+          </a:solidFill>
+          <a:ln>
+            <a:solidFill>
+              <a:srgbClr val="176E81"/>
+            </a:solidFill>
+            <a:extLst>
+              <a:ext uri="{C807C97D-BFC1-408E-A445-0C87EB9F89A2}">
+                <ask:lineSketchStyleProps xmlns:ask="http://schemas.microsoft.com/office/drawing/2018/sketchyshapes" sd="3285306786">
+                  <a:prstGeom prst="ellipse">
+                    <a:avLst/>
+                  </a:prstGeom>
+                  <ask:type>
+                    <ask:lineSketchFreehand/>
+                  </ask:type>
+                </ask:lineSketchStyleProps>
+              </a:ext>
+            </a:extLst>
+          </a:ln>
+        </p:spPr>
+        <p:style>
+          <a:lnRef idx="2">
+            <a:schemeClr val="accent1">
+              <a:shade val="15000"/>
+            </a:schemeClr>
+          </a:lnRef>
+          <a:fillRef idx="1">
+            <a:schemeClr val="accent1"/>
+          </a:fillRef>
+          <a:effectRef idx="0">
+            <a:schemeClr val="accent1"/>
+          </a:effectRef>
+          <a:fontRef idx="minor">
+            <a:schemeClr val="lt1"/>
+          </a:fontRef>
+        </p:style>
+        <p:txBody>
+          <a:bodyPr rtlCol="0" anchor="ctr"/>
+          <a:lstStyle/>
+          <a:p>
+            <a:pPr algn="ctr"/>
+            <a:endParaRPr lang="en-IL"/>
+          </a:p>
+        </p:txBody>
+      </p:sp>
+      <p:sp>
+        <p:nvSpPr>
+          <p:cNvPr id="12" name="Oval 11">
+            <a:extLst>
+              <a:ext uri="{FF2B5EF4-FFF2-40B4-BE49-F238E27FC236}">
+                <a16:creationId xmlns:a16="http://schemas.microsoft.com/office/drawing/2014/main" id="{2D57830D-BD28-7589-DD28-5C62480B67F4}"/>
+              </a:ext>
+            </a:extLst>
+          </p:cNvPr>
+          <p:cNvSpPr/>
+          <p:nvPr/>
+        </p:nvSpPr>
+        <p:spPr>
+          <a:xfrm rot="2960527">
+            <a:off x="2361966" y="419646"/>
+            <a:ext cx="1816015" cy="1416891"/>
+          </a:xfrm>
+          <a:custGeom>
+            <a:avLst/>
+            <a:gdLst>
+              <a:gd name="connsiteX0" fmla="*/ 0 w 1816015"/>
+              <a:gd name="connsiteY0" fmla="*/ 708446 h 1416891"/>
+              <a:gd name="connsiteX1" fmla="*/ 908008 w 1816015"/>
+              <a:gd name="connsiteY1" fmla="*/ 0 h 1416891"/>
+              <a:gd name="connsiteX2" fmla="*/ 1816016 w 1816015"/>
+              <a:gd name="connsiteY2" fmla="*/ 708446 h 1416891"/>
+              <a:gd name="connsiteX3" fmla="*/ 908008 w 1816015"/>
+              <a:gd name="connsiteY3" fmla="*/ 1416892 h 1416891"/>
+              <a:gd name="connsiteX4" fmla="*/ 0 w 1816015"/>
+              <a:gd name="connsiteY4" fmla="*/ 708446 h 1416891"/>
+            </a:gdLst>
+            <a:ahLst/>
+            <a:cxnLst>
+              <a:cxn ang="0">
+                <a:pos x="connsiteX0" y="connsiteY0"/>
+              </a:cxn>
+              <a:cxn ang="0">
+                <a:pos x="connsiteX1" y="connsiteY1"/>
+              </a:cxn>
+              <a:cxn ang="0">
+                <a:pos x="connsiteX2" y="connsiteY2"/>
+              </a:cxn>
+              <a:cxn ang="0">
+                <a:pos x="connsiteX3" y="connsiteY3"/>
+              </a:cxn>
+              <a:cxn ang="0">
+                <a:pos x="connsiteX4" y="connsiteY4"/>
+              </a:cxn>
+            </a:cxnLst>
+            <a:rect l="l" t="t" r="r" b="b"/>
+            <a:pathLst>
+              <a:path w="1816015" h="1416891" fill="none" extrusionOk="0">
+                <a:moveTo>
+                  <a:pt x="0" y="708446"/>
+                </a:moveTo>
+                <a:cubicBezTo>
+                  <a:pt x="-81336" y="395336"/>
+                  <a:pt x="389534" y="2694"/>
+                  <a:pt x="908008" y="0"/>
+                </a:cubicBezTo>
+                <a:cubicBezTo>
+                  <a:pt x="1432076" y="13072"/>
+                  <a:pt x="1766090" y="319344"/>
+                  <a:pt x="1816016" y="708446"/>
+                </a:cubicBezTo>
+                <a:cubicBezTo>
+                  <a:pt x="1724882" y="1025837"/>
+                  <a:pt x="1525861" y="1387484"/>
+                  <a:pt x="908008" y="1416892"/>
+                </a:cubicBezTo>
+                <a:cubicBezTo>
+                  <a:pt x="389399" y="1361317"/>
+                  <a:pt x="-40373" y="1140404"/>
+                  <a:pt x="0" y="708446"/>
+                </a:cubicBezTo>
+                <a:close/>
+              </a:path>
+              <a:path w="1816015" h="1416891" stroke="0" extrusionOk="0">
+                <a:moveTo>
+                  <a:pt x="0" y="708446"/>
+                </a:moveTo>
+                <a:cubicBezTo>
+                  <a:pt x="-70462" y="394980"/>
+                  <a:pt x="418213" y="-20374"/>
+                  <a:pt x="908008" y="0"/>
+                </a:cubicBezTo>
+                <a:cubicBezTo>
+                  <a:pt x="1443437" y="-89433"/>
+                  <a:pt x="1851333" y="323463"/>
+                  <a:pt x="1816016" y="708446"/>
+                </a:cubicBezTo>
+                <a:cubicBezTo>
+                  <a:pt x="1878555" y="1124126"/>
+                  <a:pt x="1315888" y="1404217"/>
+                  <a:pt x="908008" y="1416892"/>
+                </a:cubicBezTo>
+                <a:cubicBezTo>
+                  <a:pt x="417525" y="1349910"/>
+                  <a:pt x="-9318" y="1127980"/>
+                  <a:pt x="0" y="708446"/>
+                </a:cubicBezTo>
+                <a:close/>
+              </a:path>
+            </a:pathLst>
+          </a:custGeom>
+          <a:solidFill>
+            <a:srgbClr val="F7E9CF"/>
+          </a:solidFill>
+          <a:ln>
+            <a:solidFill>
+              <a:srgbClr val="176E81"/>
+            </a:solidFill>
+            <a:extLst>
+              <a:ext uri="{C807C97D-BFC1-408E-A445-0C87EB9F89A2}">
+                <ask:lineSketchStyleProps xmlns:ask="http://schemas.microsoft.com/office/drawing/2018/sketchyshapes" sd="3066130187">
+                  <a:prstGeom prst="ellipse">
+                    <a:avLst/>
+                  </a:prstGeom>
+                  <ask:type>
+                    <ask:lineSketchFreehand/>
+                  </ask:type>
+                </ask:lineSketchStyleProps>
+              </a:ext>
+            </a:extLst>
+          </a:ln>
+        </p:spPr>
+        <p:style>
+          <a:lnRef idx="2">
+            <a:schemeClr val="accent1">
+              <a:shade val="15000"/>
+            </a:schemeClr>
+          </a:lnRef>
+          <a:fillRef idx="1">
+            <a:schemeClr val="accent1"/>
+          </a:fillRef>
+          <a:effectRef idx="0">
+            <a:schemeClr val="accent1"/>
+          </a:effectRef>
+          <a:fontRef idx="minor">
+            <a:schemeClr val="lt1"/>
+          </a:fontRef>
+        </p:style>
+        <p:txBody>
+          <a:bodyPr rtlCol="0" anchor="ctr"/>
+          <a:lstStyle/>
+          <a:p>
+            <a:pPr algn="ctr"/>
+            <a:endParaRPr lang="en-IL"/>
+          </a:p>
+        </p:txBody>
+      </p:sp>
+      <p:sp>
+        <p:nvSpPr>
+          <p:cNvPr id="13" name="Oval 12">
+            <a:extLst>
+              <a:ext uri="{FF2B5EF4-FFF2-40B4-BE49-F238E27FC236}">
+                <a16:creationId xmlns:a16="http://schemas.microsoft.com/office/drawing/2014/main" id="{DB29A85A-1D07-3AE0-91F4-F8CC91D5C946}"/>
+              </a:ext>
+            </a:extLst>
+          </p:cNvPr>
+          <p:cNvSpPr/>
+          <p:nvPr/>
+        </p:nvSpPr>
+        <p:spPr>
+          <a:xfrm>
+            <a:off x="2285565" y="5418721"/>
+            <a:ext cx="2400295" cy="1878496"/>
+          </a:xfrm>
+          <a:custGeom>
+            <a:avLst/>
+            <a:gdLst>
+              <a:gd name="connsiteX0" fmla="*/ 0 w 2400295"/>
+              <a:gd name="connsiteY0" fmla="*/ 939248 h 1878496"/>
+              <a:gd name="connsiteX1" fmla="*/ 1200148 w 2400295"/>
+              <a:gd name="connsiteY1" fmla="*/ 0 h 1878496"/>
+              <a:gd name="connsiteX2" fmla="*/ 2400296 w 2400295"/>
+              <a:gd name="connsiteY2" fmla="*/ 939248 h 1878496"/>
+              <a:gd name="connsiteX3" fmla="*/ 1200148 w 2400295"/>
+              <a:gd name="connsiteY3" fmla="*/ 1878496 h 1878496"/>
+              <a:gd name="connsiteX4" fmla="*/ 0 w 2400295"/>
+              <a:gd name="connsiteY4" fmla="*/ 939248 h 1878496"/>
+            </a:gdLst>
+            <a:ahLst/>
+            <a:cxnLst>
+              <a:cxn ang="0">
+                <a:pos x="connsiteX0" y="connsiteY0"/>
+              </a:cxn>
+              <a:cxn ang="0">
+                <a:pos x="connsiteX1" y="connsiteY1"/>
+              </a:cxn>
+              <a:cxn ang="0">
+                <a:pos x="connsiteX2" y="connsiteY2"/>
+              </a:cxn>
+              <a:cxn ang="0">
+                <a:pos x="connsiteX3" y="connsiteY3"/>
+              </a:cxn>
+              <a:cxn ang="0">
+                <a:pos x="connsiteX4" y="connsiteY4"/>
+              </a:cxn>
+            </a:cxnLst>
+            <a:rect l="l" t="t" r="r" b="b"/>
+            <a:pathLst>
+              <a:path w="2400295" h="1878496" fill="none" extrusionOk="0">
+                <a:moveTo>
+                  <a:pt x="0" y="939248"/>
+                </a:moveTo>
+                <a:cubicBezTo>
+                  <a:pt x="27829" y="312717"/>
+                  <a:pt x="517220" y="-20955"/>
+                  <a:pt x="1200148" y="0"/>
+                </a:cubicBezTo>
+                <a:cubicBezTo>
+                  <a:pt x="1980441" y="-44033"/>
+                  <a:pt x="2323614" y="495890"/>
+                  <a:pt x="2400296" y="939248"/>
+                </a:cubicBezTo>
+                <a:cubicBezTo>
+                  <a:pt x="2424356" y="1450464"/>
+                  <a:pt x="1828710" y="1863178"/>
+                  <a:pt x="1200148" y="1878496"/>
+                </a:cubicBezTo>
+                <a:cubicBezTo>
+                  <a:pt x="578480" y="1782708"/>
+                  <a:pt x="-24583" y="1399815"/>
+                  <a:pt x="0" y="939248"/>
+                </a:cubicBezTo>
+                <a:close/>
+              </a:path>
+              <a:path w="2400295" h="1878496" stroke="0" extrusionOk="0">
+                <a:moveTo>
+                  <a:pt x="0" y="939248"/>
+                </a:moveTo>
+                <a:cubicBezTo>
+                  <a:pt x="-38427" y="401229"/>
+                  <a:pt x="475754" y="10991"/>
+                  <a:pt x="1200148" y="0"/>
+                </a:cubicBezTo>
+                <a:cubicBezTo>
+                  <a:pt x="1831680" y="-76073"/>
+                  <a:pt x="2427997" y="424571"/>
+                  <a:pt x="2400296" y="939248"/>
+                </a:cubicBezTo>
+                <a:cubicBezTo>
+                  <a:pt x="2476522" y="1416971"/>
+                  <a:pt x="1831216" y="1911847"/>
+                  <a:pt x="1200148" y="1878496"/>
+                </a:cubicBezTo>
+                <a:cubicBezTo>
+                  <a:pt x="425584" y="1815953"/>
+                  <a:pt x="-23180" y="1451989"/>
+                  <a:pt x="0" y="939248"/>
+                </a:cubicBezTo>
+                <a:close/>
+              </a:path>
+            </a:pathLst>
+          </a:custGeom>
+          <a:solidFill>
+            <a:srgbClr val="F7E9CF"/>
+          </a:solidFill>
+          <a:ln>
+            <a:solidFill>
+              <a:srgbClr val="176E81"/>
+            </a:solidFill>
+            <a:extLst>
+              <a:ext uri="{C807C97D-BFC1-408E-A445-0C87EB9F89A2}">
+                <ask:lineSketchStyleProps xmlns:ask="http://schemas.microsoft.com/office/drawing/2018/sketchyshapes" sd="1522039321">
+                  <a:prstGeom prst="ellipse">
+                    <a:avLst/>
+                  </a:prstGeom>
+                  <ask:type>
+                    <ask:lineSketchFreehand/>
+                  </ask:type>
+                </ask:lineSketchStyleProps>
+              </a:ext>
+            </a:extLst>
+          </a:ln>
+        </p:spPr>
+        <p:style>
+          <a:lnRef idx="2">
+            <a:schemeClr val="accent1">
+              <a:shade val="15000"/>
+            </a:schemeClr>
+          </a:lnRef>
+          <a:fillRef idx="1">
+            <a:schemeClr val="accent1"/>
+          </a:fillRef>
+          <a:effectRef idx="0">
+            <a:schemeClr val="accent1"/>
+          </a:effectRef>
+          <a:fontRef idx="minor">
+            <a:schemeClr val="lt1"/>
+          </a:fontRef>
+        </p:style>
+        <p:txBody>
+          <a:bodyPr rtlCol="0" anchor="ctr"/>
+          <a:lstStyle/>
+          <a:p>
+            <a:pPr algn="ctr"/>
+            <a:endParaRPr lang="en-IL"/>
+          </a:p>
+        </p:txBody>
+      </p:sp>
+      <p:sp>
+        <p:nvSpPr>
+          <p:cNvPr id="14" name="Oval 13">
+            <a:extLst>
+              <a:ext uri="{FF2B5EF4-FFF2-40B4-BE49-F238E27FC236}">
+                <a16:creationId xmlns:a16="http://schemas.microsoft.com/office/drawing/2014/main" id="{9F579FA4-786E-2368-1F8A-E9B325A88F35}"/>
+              </a:ext>
+            </a:extLst>
+          </p:cNvPr>
+          <p:cNvSpPr/>
+          <p:nvPr/>
+        </p:nvSpPr>
+        <p:spPr>
+          <a:xfrm rot="3934008">
+            <a:off x="10991179" y="5418721"/>
+            <a:ext cx="2400295" cy="1878496"/>
+          </a:xfrm>
+          <a:custGeom>
+            <a:avLst/>
+            <a:gdLst>
+              <a:gd name="connsiteX0" fmla="*/ 0 w 2400295"/>
+              <a:gd name="connsiteY0" fmla="*/ 939248 h 1878496"/>
+              <a:gd name="connsiteX1" fmla="*/ 1200148 w 2400295"/>
+              <a:gd name="connsiteY1" fmla="*/ 0 h 1878496"/>
+              <a:gd name="connsiteX2" fmla="*/ 2400296 w 2400295"/>
+              <a:gd name="connsiteY2" fmla="*/ 939248 h 1878496"/>
+              <a:gd name="connsiteX3" fmla="*/ 1200148 w 2400295"/>
+              <a:gd name="connsiteY3" fmla="*/ 1878496 h 1878496"/>
+              <a:gd name="connsiteX4" fmla="*/ 0 w 2400295"/>
+              <a:gd name="connsiteY4" fmla="*/ 939248 h 1878496"/>
+            </a:gdLst>
+            <a:ahLst/>
+            <a:cxnLst>
+              <a:cxn ang="0">
+                <a:pos x="connsiteX0" y="connsiteY0"/>
+              </a:cxn>
+              <a:cxn ang="0">
+                <a:pos x="connsiteX1" y="connsiteY1"/>
+              </a:cxn>
+              <a:cxn ang="0">
+                <a:pos x="connsiteX2" y="connsiteY2"/>
+              </a:cxn>
+              <a:cxn ang="0">
+                <a:pos x="connsiteX3" y="connsiteY3"/>
+              </a:cxn>
+              <a:cxn ang="0">
+                <a:pos x="connsiteX4" y="connsiteY4"/>
+              </a:cxn>
+            </a:cxnLst>
+            <a:rect l="l" t="t" r="r" b="b"/>
+            <a:pathLst>
+              <a:path w="2400295" h="1878496" fill="none" extrusionOk="0">
+                <a:moveTo>
+                  <a:pt x="0" y="939248"/>
+                </a:moveTo>
+                <a:cubicBezTo>
+                  <a:pt x="-112150" y="469533"/>
+                  <a:pt x="490201" y="1583"/>
+                  <a:pt x="1200148" y="0"/>
+                </a:cubicBezTo>
+                <a:cubicBezTo>
+                  <a:pt x="1818148" y="28126"/>
+                  <a:pt x="2392719" y="453365"/>
+                  <a:pt x="2400296" y="939248"/>
+                </a:cubicBezTo>
+                <a:cubicBezTo>
+                  <a:pt x="2260574" y="1369308"/>
+                  <a:pt x="1881177" y="1717314"/>
+                  <a:pt x="1200148" y="1878496"/>
+                </a:cubicBezTo>
+                <a:cubicBezTo>
+                  <a:pt x="552955" y="1892943"/>
+                  <a:pt x="6561" y="1347563"/>
+                  <a:pt x="0" y="939248"/>
+                </a:cubicBezTo>
+                <a:close/>
+              </a:path>
+              <a:path w="2400295" h="1878496" stroke="0" extrusionOk="0">
+                <a:moveTo>
+                  <a:pt x="0" y="939248"/>
+                </a:moveTo>
+                <a:cubicBezTo>
+                  <a:pt x="48985" y="348377"/>
+                  <a:pt x="501805" y="-39933"/>
+                  <a:pt x="1200148" y="0"/>
+                </a:cubicBezTo>
+                <a:cubicBezTo>
+                  <a:pt x="1823168" y="-20715"/>
+                  <a:pt x="2335671" y="440380"/>
+                  <a:pt x="2400296" y="939248"/>
+                </a:cubicBezTo>
+                <a:cubicBezTo>
+                  <a:pt x="2389617" y="1322601"/>
+                  <a:pt x="1926821" y="1965690"/>
+                  <a:pt x="1200148" y="1878496"/>
+                </a:cubicBezTo>
+                <a:cubicBezTo>
+                  <a:pt x="496825" y="1851589"/>
+                  <a:pt x="37691" y="1445434"/>
+                  <a:pt x="0" y="939248"/>
+                </a:cubicBezTo>
+                <a:close/>
+              </a:path>
+            </a:pathLst>
+          </a:custGeom>
+          <a:solidFill>
+            <a:srgbClr val="F7E9CF"/>
+          </a:solidFill>
+          <a:ln>
+            <a:solidFill>
+              <a:srgbClr val="176E81"/>
+            </a:solidFill>
+            <a:extLst>
+              <a:ext uri="{C807C97D-BFC1-408E-A445-0C87EB9F89A2}">
+                <ask:lineSketchStyleProps xmlns:ask="http://schemas.microsoft.com/office/drawing/2018/sketchyshapes" sd="3944253169">
+                  <a:prstGeom prst="ellipse">
+                    <a:avLst/>
+                  </a:prstGeom>
+                  <ask:type>
+                    <ask:lineSketchFreehand/>
+                  </ask:type>
+                </ask:lineSketchStyleProps>
+              </a:ext>
+            </a:extLst>
+          </a:ln>
+        </p:spPr>
+        <p:style>
+          <a:lnRef idx="2">
+            <a:schemeClr val="accent1">
+              <a:shade val="15000"/>
+            </a:schemeClr>
+          </a:lnRef>
+          <a:fillRef idx="1">
+            <a:schemeClr val="accent1"/>
+          </a:fillRef>
+          <a:effectRef idx="0">
+            <a:schemeClr val="accent1"/>
+          </a:effectRef>
+          <a:fontRef idx="minor">
+            <a:schemeClr val="lt1"/>
+          </a:fontRef>
+        </p:style>
+        <p:txBody>
+          <a:bodyPr rtlCol="0" anchor="ctr"/>
+          <a:lstStyle/>
+          <a:p>
+            <a:pPr algn="ctr"/>
+            <a:endParaRPr lang="en-IL"/>
+          </a:p>
+        </p:txBody>
+      </p:sp>
+      <p:sp>
+        <p:nvSpPr>
+          <p:cNvPr id="15" name="Oval 14">
+            <a:extLst>
+              <a:ext uri="{FF2B5EF4-FFF2-40B4-BE49-F238E27FC236}">
+                <a16:creationId xmlns:a16="http://schemas.microsoft.com/office/drawing/2014/main" id="{59F89BDC-9A59-60CC-32C9-523D703705AA}"/>
+              </a:ext>
+            </a:extLst>
+          </p:cNvPr>
+          <p:cNvSpPr/>
+          <p:nvPr/>
+        </p:nvSpPr>
+        <p:spPr>
+          <a:xfrm rot="17692445">
+            <a:off x="10469222" y="417442"/>
+            <a:ext cx="2400295" cy="1878496"/>
+          </a:xfrm>
+          <a:custGeom>
+            <a:avLst/>
+            <a:gdLst>
+              <a:gd name="connsiteX0" fmla="*/ 0 w 2400295"/>
+              <a:gd name="connsiteY0" fmla="*/ 939248 h 1878496"/>
+              <a:gd name="connsiteX1" fmla="*/ 1200148 w 2400295"/>
+              <a:gd name="connsiteY1" fmla="*/ 0 h 1878496"/>
+              <a:gd name="connsiteX2" fmla="*/ 2400296 w 2400295"/>
+              <a:gd name="connsiteY2" fmla="*/ 939248 h 1878496"/>
+              <a:gd name="connsiteX3" fmla="*/ 1200148 w 2400295"/>
+              <a:gd name="connsiteY3" fmla="*/ 1878496 h 1878496"/>
+              <a:gd name="connsiteX4" fmla="*/ 0 w 2400295"/>
+              <a:gd name="connsiteY4" fmla="*/ 939248 h 1878496"/>
+            </a:gdLst>
+            <a:ahLst/>
+            <a:cxnLst>
+              <a:cxn ang="0">
+                <a:pos x="connsiteX0" y="connsiteY0"/>
+              </a:cxn>
+              <a:cxn ang="0">
+                <a:pos x="connsiteX1" y="connsiteY1"/>
+              </a:cxn>
+              <a:cxn ang="0">
+                <a:pos x="connsiteX2" y="connsiteY2"/>
+              </a:cxn>
+              <a:cxn ang="0">
+                <a:pos x="connsiteX3" y="connsiteY3"/>
+              </a:cxn>
+              <a:cxn ang="0">
+                <a:pos x="connsiteX4" y="connsiteY4"/>
+              </a:cxn>
+            </a:cxnLst>
+            <a:rect l="l" t="t" r="r" b="b"/>
+            <a:pathLst>
+              <a:path w="2400295" h="1878496" fill="none" extrusionOk="0">
+                <a:moveTo>
+                  <a:pt x="0" y="939248"/>
+                </a:moveTo>
+                <a:cubicBezTo>
+                  <a:pt x="126980" y="466860"/>
+                  <a:pt x="464896" y="36295"/>
+                  <a:pt x="1200148" y="0"/>
+                </a:cubicBezTo>
+                <a:cubicBezTo>
+                  <a:pt x="1871259" y="-15226"/>
+                  <a:pt x="2409789" y="439870"/>
+                  <a:pt x="2400296" y="939248"/>
+                </a:cubicBezTo>
+                <a:cubicBezTo>
+                  <a:pt x="2425788" y="1324388"/>
+                  <a:pt x="1846494" y="1836965"/>
+                  <a:pt x="1200148" y="1878496"/>
+                </a:cubicBezTo>
+                <a:cubicBezTo>
+                  <a:pt x="522405" y="1864967"/>
+                  <a:pt x="10337" y="1524919"/>
+                  <a:pt x="0" y="939248"/>
+                </a:cubicBezTo>
+                <a:close/>
+              </a:path>
+              <a:path w="2400295" h="1878496" stroke="0" extrusionOk="0">
+                <a:moveTo>
+                  <a:pt x="0" y="939248"/>
+                </a:moveTo>
+                <a:cubicBezTo>
+                  <a:pt x="-41430" y="467601"/>
+                  <a:pt x="489091" y="-119424"/>
+                  <a:pt x="1200148" y="0"/>
+                </a:cubicBezTo>
+                <a:cubicBezTo>
+                  <a:pt x="1859277" y="-17064"/>
+                  <a:pt x="2389838" y="532081"/>
+                  <a:pt x="2400296" y="939248"/>
+                </a:cubicBezTo>
+                <a:cubicBezTo>
+                  <a:pt x="2386181" y="1440715"/>
+                  <a:pt x="1860680" y="1959604"/>
+                  <a:pt x="1200148" y="1878496"/>
+                </a:cubicBezTo>
+                <a:cubicBezTo>
+                  <a:pt x="540162" y="1804269"/>
+                  <a:pt x="-100159" y="1428227"/>
+                  <a:pt x="0" y="939248"/>
+                </a:cubicBezTo>
+                <a:close/>
+              </a:path>
+            </a:pathLst>
+          </a:custGeom>
+          <a:solidFill>
+            <a:srgbClr val="F7E9CF"/>
+          </a:solidFill>
+          <a:ln>
+            <a:solidFill>
+              <a:srgbClr val="176E81"/>
+            </a:solidFill>
+            <a:extLst>
+              <a:ext uri="{C807C97D-BFC1-408E-A445-0C87EB9F89A2}">
+                <ask:lineSketchStyleProps xmlns:ask="http://schemas.microsoft.com/office/drawing/2018/sketchyshapes" sd="1974435248">
+                  <a:prstGeom prst="ellipse">
+                    <a:avLst/>
+                  </a:prstGeom>
+                  <ask:type>
+                    <ask:lineSketchFreehand/>
+                  </ask:type>
+                </ask:lineSketchStyleProps>
+              </a:ext>
+            </a:extLst>
+          </a:ln>
+        </p:spPr>
+        <p:style>
+          <a:lnRef idx="2">
+            <a:schemeClr val="accent1">
+              <a:shade val="15000"/>
+            </a:schemeClr>
+          </a:lnRef>
+          <a:fillRef idx="1">
+            <a:schemeClr val="accent1"/>
+          </a:fillRef>
+          <a:effectRef idx="0">
+            <a:schemeClr val="accent1"/>
+          </a:effectRef>
+          <a:fontRef idx="minor">
+            <a:schemeClr val="lt1"/>
+          </a:fontRef>
+        </p:style>
+        <p:txBody>
+          <a:bodyPr rtlCol="0" anchor="ctr"/>
+          <a:lstStyle/>
+          <a:p>
+            <a:pPr algn="ctr"/>
+            <a:endParaRPr lang="en-IL"/>
+          </a:p>
+        </p:txBody>
+      </p:sp>
+      <p:sp>
+        <p:nvSpPr>
+          <p:cNvPr id="16" name="Oval 15">
+            <a:extLst>
+              <a:ext uri="{FF2B5EF4-FFF2-40B4-BE49-F238E27FC236}">
+                <a16:creationId xmlns:a16="http://schemas.microsoft.com/office/drawing/2014/main" id="{A76F01F9-8913-475B-524F-ED7CCA76F4D0}"/>
+              </a:ext>
+            </a:extLst>
+          </p:cNvPr>
+          <p:cNvSpPr/>
+          <p:nvPr/>
+        </p:nvSpPr>
+        <p:spPr>
+          <a:xfrm>
+            <a:off x="6953221" y="-299830"/>
+            <a:ext cx="1236604" cy="1328530"/>
+          </a:xfrm>
+          <a:custGeom>
+            <a:avLst/>
+            <a:gdLst>
+              <a:gd name="connsiteX0" fmla="*/ 0 w 1236604"/>
+              <a:gd name="connsiteY0" fmla="*/ 664265 h 1328530"/>
+              <a:gd name="connsiteX1" fmla="*/ 618302 w 1236604"/>
+              <a:gd name="connsiteY1" fmla="*/ 0 h 1328530"/>
+              <a:gd name="connsiteX2" fmla="*/ 1236604 w 1236604"/>
+              <a:gd name="connsiteY2" fmla="*/ 664265 h 1328530"/>
+              <a:gd name="connsiteX3" fmla="*/ 618302 w 1236604"/>
+              <a:gd name="connsiteY3" fmla="*/ 1328530 h 1328530"/>
+              <a:gd name="connsiteX4" fmla="*/ 0 w 1236604"/>
+              <a:gd name="connsiteY4" fmla="*/ 664265 h 1328530"/>
+            </a:gdLst>
+            <a:ahLst/>
+            <a:cxnLst>
+              <a:cxn ang="0">
+                <a:pos x="connsiteX0" y="connsiteY0"/>
+              </a:cxn>
+              <a:cxn ang="0">
+                <a:pos x="connsiteX1" y="connsiteY1"/>
+              </a:cxn>
+              <a:cxn ang="0">
+                <a:pos x="connsiteX2" y="connsiteY2"/>
+              </a:cxn>
+              <a:cxn ang="0">
+                <a:pos x="connsiteX3" y="connsiteY3"/>
+              </a:cxn>
+              <a:cxn ang="0">
+                <a:pos x="connsiteX4" y="connsiteY4"/>
+              </a:cxn>
+            </a:cxnLst>
+            <a:rect l="l" t="t" r="r" b="b"/>
+            <a:pathLst>
+              <a:path w="1236604" h="1328530" fill="none" extrusionOk="0">
+                <a:moveTo>
+                  <a:pt x="0" y="664265"/>
+                </a:moveTo>
+                <a:cubicBezTo>
+                  <a:pt x="3879" y="310443"/>
+                  <a:pt x="269602" y="-4292"/>
+                  <a:pt x="618302" y="0"/>
+                </a:cubicBezTo>
+                <a:cubicBezTo>
+                  <a:pt x="927198" y="-66967"/>
+                  <a:pt x="1175575" y="316622"/>
+                  <a:pt x="1236604" y="664265"/>
+                </a:cubicBezTo>
+                <a:cubicBezTo>
+                  <a:pt x="1234110" y="1055587"/>
+                  <a:pt x="1005693" y="1361340"/>
+                  <a:pt x="618302" y="1328530"/>
+                </a:cubicBezTo>
+                <a:cubicBezTo>
+                  <a:pt x="226307" y="1343644"/>
+                  <a:pt x="8242" y="1038794"/>
+                  <a:pt x="0" y="664265"/>
+                </a:cubicBezTo>
+                <a:close/>
+              </a:path>
+              <a:path w="1236604" h="1328530" stroke="0" extrusionOk="0">
+                <a:moveTo>
+                  <a:pt x="0" y="664265"/>
+                </a:moveTo>
+                <a:cubicBezTo>
+                  <a:pt x="54128" y="360404"/>
+                  <a:pt x="279449" y="-16154"/>
+                  <a:pt x="618302" y="0"/>
+                </a:cubicBezTo>
+                <a:cubicBezTo>
+                  <a:pt x="919180" y="37327"/>
+                  <a:pt x="1214416" y="287852"/>
+                  <a:pt x="1236604" y="664265"/>
+                </a:cubicBezTo>
+                <a:cubicBezTo>
+                  <a:pt x="1229340" y="1055214"/>
+                  <a:pt x="974015" y="1344540"/>
+                  <a:pt x="618302" y="1328530"/>
+                </a:cubicBezTo>
+                <a:cubicBezTo>
+                  <a:pt x="303235" y="1370195"/>
+                  <a:pt x="49299" y="1089104"/>
+                  <a:pt x="0" y="664265"/>
+                </a:cubicBezTo>
+                <a:close/>
+              </a:path>
+            </a:pathLst>
+          </a:custGeom>
+          <a:solidFill>
+            <a:srgbClr val="F7E9CF"/>
+          </a:solidFill>
+          <a:ln>
+            <a:solidFill>
+              <a:srgbClr val="176E81"/>
+            </a:solidFill>
+            <a:extLst>
+              <a:ext uri="{C807C97D-BFC1-408E-A445-0C87EB9F89A2}">
+                <ask:lineSketchStyleProps xmlns:ask="http://schemas.microsoft.com/office/drawing/2018/sketchyshapes" sd="247070854">
+                  <a:prstGeom prst="ellipse">
+                    <a:avLst/>
+                  </a:prstGeom>
+                  <ask:type>
+                    <ask:lineSketchFreehand/>
+                  </ask:type>
+                </ask:lineSketchStyleProps>
+              </a:ext>
+            </a:extLst>
+          </a:ln>
+        </p:spPr>
+        <p:style>
+          <a:lnRef idx="2">
+            <a:schemeClr val="accent1">
+              <a:shade val="15000"/>
+            </a:schemeClr>
+          </a:lnRef>
+          <a:fillRef idx="1">
+            <a:schemeClr val="accent1"/>
+          </a:fillRef>
+          <a:effectRef idx="0">
+            <a:schemeClr val="accent1"/>
+          </a:effectRef>
+          <a:fontRef idx="minor">
+            <a:schemeClr val="lt1"/>
+          </a:fontRef>
+        </p:style>
+        <p:txBody>
+          <a:bodyPr rtlCol="0" anchor="ctr"/>
+          <a:lstStyle/>
+          <a:p>
+            <a:pPr algn="ctr"/>
+            <a:endParaRPr lang="en-IL"/>
+          </a:p>
+        </p:txBody>
+      </p:sp>
+      <p:sp>
+        <p:nvSpPr>
+          <p:cNvPr id="17" name="TextBox 16">
+            <a:extLst>
+              <a:ext uri="{FF2B5EF4-FFF2-40B4-BE49-F238E27FC236}">
+                <a16:creationId xmlns:a16="http://schemas.microsoft.com/office/drawing/2014/main" id="{5EF21028-B090-D802-9C7A-9CD51A5F7922}"/>
+              </a:ext>
+            </a:extLst>
+          </p:cNvPr>
+          <p:cNvSpPr txBox="1"/>
+          <p:nvPr/>
+        </p:nvSpPr>
+        <p:spPr>
+          <a:xfrm>
+            <a:off x="4694143" y="3448709"/>
+            <a:ext cx="5257800" cy="1323439"/>
           </a:xfrm>
           <a:prstGeom prst="rect">
             <a:avLst/>
           </a:prstGeom>
           <a:noFill/>
-          <a:ln/>
         </p:spPr>
         <p:txBody>
-          <a:bodyPr wrap="none" lIns="0" tIns="0" rIns="0" bIns="0" rtlCol="0" anchor="t"/>
+          <a:bodyPr wrap="square" rtlCol="0">
+            <a:spAutoFit/>
+          </a:bodyPr>
           <a:lstStyle/>
           <a:p>
-            <a:pPr marL="0" indent="0">
-              <a:lnSpc>
-                <a:spcPts val="5550"/>
-              </a:lnSpc>
-              <a:buNone/>
-            </a:pPr>
             <a:r>
-              <a:rPr lang="en-US" sz="4450" dirty="0">
+              <a:rPr lang="en-US" sz="8000" dirty="0">
                 <a:solidFill>
-                  <a:srgbClr val="124E73"/>
+                  <a:srgbClr val="176E81"/>
                 </a:solidFill>
                 <a:latin typeface="Mongolian Baiti" panose="03000500000000000000" pitchFamily="66" charset="0"/>
-                <a:ea typeface="MuseoModerno Medium" pitchFamily="34" charset="-122"/>
                 <a:cs typeface="Mongolian Baiti" panose="03000500000000000000" pitchFamily="66" charset="0"/>
               </a:rPr>
               <a:t>Thank You</a:t>
             </a:r>
-            <a:endParaRPr lang="en-US" sz="4450" dirty="0">
+            <a:endParaRPr lang="en-IL" sz="8000" dirty="0">
+              <a:solidFill>
+                <a:srgbClr val="176E81"/>
+              </a:solidFill>
               <a:latin typeface="Mongolian Baiti" panose="03000500000000000000" pitchFamily="66" charset="0"/>
               <a:cs typeface="Mongolian Baiti" panose="03000500000000000000" pitchFamily="66" charset="0"/>
             </a:endParaRPr>
           </a:p>
         </p:txBody>
       </p:sp>
-      <p:sp>
-        <p:nvSpPr>
-          <p:cNvPr id="4" name="Text 1"/>
-          <p:cNvSpPr/>
-          <p:nvPr/>
-        </p:nvSpPr>
-        <p:spPr>
-          <a:xfrm>
-            <a:off x="6280190" y="4094917"/>
-            <a:ext cx="7556421" cy="1088708"/>
-          </a:xfrm>
-          <a:prstGeom prst="rect">
-            <a:avLst/>
-          </a:prstGeom>
-          <a:noFill/>
-          <a:ln/>
-        </p:spPr>
-        <p:txBody>
-          <a:bodyPr wrap="square" lIns="0" tIns="0" rIns="0" bIns="0" rtlCol="0" anchor="t"/>
-          <a:lstStyle/>
-          <a:p>
-            <a:pPr marL="0" indent="0">
-              <a:lnSpc>
-                <a:spcPts val="2850"/>
-              </a:lnSpc>
-              <a:buNone/>
-            </a:pPr>
-            <a:r>
-              <a:rPr lang="en-US" sz="1750" dirty="0">
-                <a:solidFill>
-                  <a:srgbClr val="2B4150"/>
-                </a:solidFill>
-                <a:latin typeface="Source Sans Pro" pitchFamily="34" charset="0"/>
-                <a:ea typeface="Source Sans Pro" pitchFamily="34" charset="-122"/>
-                <a:cs typeface="Source Sans Pro" pitchFamily="34" charset="-120"/>
-              </a:rPr>
-              <a:t>This presentation has provided an overview of the QA Automation project. By utilizing a variety of libraries, frameworks, and methodologies, the project ensures the quality and functionality of the shopping website.</a:t>
-            </a:r>
-            <a:endParaRPr lang="en-US" sz="1750" dirty="0"/>
-          </a:p>
-        </p:txBody>
-      </p:sp>
     </p:spTree>
+    <p:extLst>
+      <p:ext uri="{BB962C8B-B14F-4D97-AF65-F5344CB8AC3E}">
+        <p14:creationId xmlns:p14="http://schemas.microsoft.com/office/powerpoint/2010/main" val="35463564"/>
+      </p:ext>
+    </p:extLst>
   </p:cSld>
   <p:clrMapOvr>
     <a:masterClrMapping/>

</xml_diff>